<commit_message>
updated intro to workshop slide and README.md
</commit_message>
<xml_diff>
--- a/Day_1/Lectures/Day_1_Introduction_to_Workshop.pptx
+++ b/Day_1/Lectures/Day_1_Introduction_to_Workshop.pptx
@@ -15,6 +15,9 @@
     <p:sldId id="259" r:id="rId10"/>
     <p:sldId id="260" r:id="rId11"/>
     <p:sldId id="261" r:id="rId12"/>
+    <p:sldId id="262" r:id="rId13"/>
+    <p:sldId id="263" r:id="rId14"/>
+    <p:sldId id="264" r:id="rId15"/>
   </p:sldIdLst>
   <p:sldSz cy="5143500" cx="9144000"/>
   <p:notesSz cx="6858000" cy="9144000"/>
@@ -1184,7 +1187,7 @@
       </p:grpSpPr>
       <p:sp>
         <p:nvSpPr>
-          <p:cNvPr id="120" name="Google Shape;120;g129cff206dc_0_0:notes"/>
+          <p:cNvPr id="120" name="Google Shape;120;g12c01152a48_0_0:notes"/>
           <p:cNvSpPr/>
           <p:nvPr>
             <p:ph idx="2" type="sldImg"/>
@@ -1219,7 +1222,381 @@
       </p:sp>
       <p:sp>
         <p:nvSpPr>
-          <p:cNvPr id="121" name="Google Shape;121;g129cff206dc_0_0:notes"/>
+          <p:cNvPr id="121" name="Google Shape;121;g12c01152a48_0_0:notes"/>
+          <p:cNvSpPr txBox="1"/>
+          <p:nvPr>
+            <p:ph idx="1" type="body"/>
+          </p:nvPr>
+        </p:nvSpPr>
+        <p:spPr>
+          <a:xfrm>
+            <a:off x="685800" y="4343400"/>
+            <a:ext cx="5486400" cy="4114800"/>
+          </a:xfrm>
+          <a:prstGeom prst="rect">
+            <a:avLst/>
+          </a:prstGeom>
+        </p:spPr>
+        <p:txBody>
+          <a:bodyPr anchorCtr="0" anchor="t" bIns="91425" lIns="91425" spcFirstLastPara="1" rIns="91425" wrap="square" tIns="91425">
+            <a:noAutofit/>
+          </a:bodyPr>
+          <a:lstStyle/>
+          <a:p>
+            <a:pPr indent="0" lvl="0" marL="0" rtl="0" algn="l">
+              <a:lnSpc>
+                <a:spcPct val="115000"/>
+              </a:lnSpc>
+              <a:spcBef>
+                <a:spcPts val="0"/>
+              </a:spcBef>
+              <a:spcAft>
+                <a:spcPts val="0"/>
+              </a:spcAft>
+              <a:buNone/>
+            </a:pPr>
+            <a:r>
+              <a:t/>
+            </a:r>
+            <a:endParaRPr sz="700">
+              <a:solidFill>
+                <a:schemeClr val="dk1"/>
+              </a:solidFill>
+            </a:endParaRPr>
+          </a:p>
+          <a:p>
+            <a:pPr indent="0" lvl="0" marL="0" rtl="0" algn="l">
+              <a:lnSpc>
+                <a:spcPct val="115000"/>
+              </a:lnSpc>
+              <a:spcBef>
+                <a:spcPts val="0"/>
+              </a:spcBef>
+              <a:spcAft>
+                <a:spcPts val="0"/>
+              </a:spcAft>
+              <a:buNone/>
+            </a:pPr>
+            <a:r>
+              <a:t/>
+            </a:r>
+            <a:endParaRPr sz="700">
+              <a:solidFill>
+                <a:schemeClr val="dk1"/>
+              </a:solidFill>
+            </a:endParaRPr>
+          </a:p>
+          <a:p>
+            <a:pPr indent="0" lvl="0" marL="0" rtl="0" algn="l">
+              <a:lnSpc>
+                <a:spcPct val="115000"/>
+              </a:lnSpc>
+              <a:spcBef>
+                <a:spcPts val="0"/>
+              </a:spcBef>
+              <a:spcAft>
+                <a:spcPts val="0"/>
+              </a:spcAft>
+              <a:buNone/>
+            </a:pPr>
+            <a:r>
+              <a:t/>
+            </a:r>
+            <a:endParaRPr sz="700">
+              <a:solidFill>
+                <a:schemeClr val="dk1"/>
+              </a:solidFill>
+            </a:endParaRPr>
+          </a:p>
+          <a:p>
+            <a:pPr indent="0" lvl="0" marL="0" rtl="0" algn="l">
+              <a:lnSpc>
+                <a:spcPct val="115000"/>
+              </a:lnSpc>
+              <a:spcBef>
+                <a:spcPts val="0"/>
+              </a:spcBef>
+              <a:spcAft>
+                <a:spcPts val="0"/>
+              </a:spcAft>
+              <a:buNone/>
+            </a:pPr>
+            <a:r>
+              <a:t/>
+            </a:r>
+            <a:endParaRPr sz="700">
+              <a:solidFill>
+                <a:schemeClr val="dk1"/>
+              </a:solidFill>
+            </a:endParaRPr>
+          </a:p>
+          <a:p>
+            <a:pPr indent="0" lvl="0" marL="0" rtl="0" algn="l">
+              <a:spcBef>
+                <a:spcPts val="0"/>
+              </a:spcBef>
+              <a:spcAft>
+                <a:spcPts val="0"/>
+              </a:spcAft>
+              <a:buNone/>
+            </a:pPr>
+            <a:r>
+              <a:t/>
+            </a:r>
+            <a:endParaRPr/>
+          </a:p>
+        </p:txBody>
+      </p:sp>
+    </p:spTree>
+  </p:cSld>
+  <p:clrMapOvr>
+    <a:masterClrMapping/>
+  </p:clrMapOvr>
+</p:notes>
+</file>
+
+<file path=ppt/notesSlides/notesSlide5.xml><?xml version="1.0" encoding="utf-8"?>
+<p:notes xmlns:a="http://schemas.openxmlformats.org/drawingml/2006/main" xmlns:r="http://schemas.openxmlformats.org/officeDocument/2006/relationships" xmlns:mc="http://schemas.openxmlformats.org/markup-compatibility/2006" xmlns:mv="urn:schemas-microsoft-com:mac:vml" xmlns:p="http://schemas.openxmlformats.org/presentationml/2006/main" xmlns:c="http://schemas.openxmlformats.org/drawingml/2006/chart" xmlns:dgm="http://schemas.openxmlformats.org/drawingml/2006/diagram" xmlns:o="urn:schemas-microsoft-com:office:office" xmlns:v="urn:schemas-microsoft-com:vml" xmlns:pvml="urn:schemas-microsoft-com:office:powerpoint" xmlns:com="http://schemas.openxmlformats.org/drawingml/2006/compatibility" xmlns:p14="http://schemas.microsoft.com/office/powerpoint/2010/main" xmlns:p15="http://schemas.microsoft.com/office/powerpoint/2012/main" xmlns:ahyp="http://schemas.microsoft.com/office/drawing/2018/hyperlinkcolor" showMasterPhAnim="0" showMasterSp="0">
+  <p:cSld>
+    <p:spTree>
+      <p:nvGrpSpPr>
+        <p:cNvPr id="127" name="Shape 127"/>
+        <p:cNvGrpSpPr/>
+        <p:nvPr/>
+      </p:nvGrpSpPr>
+      <p:grpSpPr>
+        <a:xfrm>
+          <a:off x="0" y="0"/>
+          <a:ext cx="0" cy="0"/>
+          <a:chOff x="0" y="0"/>
+          <a:chExt cx="0" cy="0"/>
+        </a:xfrm>
+      </p:grpSpPr>
+      <p:sp>
+        <p:nvSpPr>
+          <p:cNvPr id="128" name="Google Shape;128;g12c01152a48_0_9:notes"/>
+          <p:cNvSpPr/>
+          <p:nvPr>
+            <p:ph idx="2" type="sldImg"/>
+          </p:nvPr>
+        </p:nvSpPr>
+        <p:spPr>
+          <a:xfrm>
+            <a:off x="381188" y="685800"/>
+            <a:ext cx="6096300" cy="3429000"/>
+          </a:xfrm>
+          <a:custGeom>
+            <a:rect b="b" l="l" r="r" t="t"/>
+            <a:pathLst>
+              <a:path extrusionOk="0" h="120000" w="120000">
+                <a:moveTo>
+                  <a:pt x="0" y="0"/>
+                </a:moveTo>
+                <a:lnTo>
+                  <a:pt x="120000" y="0"/>
+                </a:lnTo>
+                <a:lnTo>
+                  <a:pt x="120000" y="120000"/>
+                </a:lnTo>
+                <a:lnTo>
+                  <a:pt x="0" y="120000"/>
+                </a:lnTo>
+                <a:close/>
+              </a:path>
+            </a:pathLst>
+          </a:custGeom>
+        </p:spPr>
+      </p:sp>
+      <p:sp>
+        <p:nvSpPr>
+          <p:cNvPr id="129" name="Google Shape;129;g12c01152a48_0_9:notes"/>
+          <p:cNvSpPr txBox="1"/>
+          <p:nvPr>
+            <p:ph idx="1" type="body"/>
+          </p:nvPr>
+        </p:nvSpPr>
+        <p:spPr>
+          <a:xfrm>
+            <a:off x="685800" y="4343400"/>
+            <a:ext cx="5486400" cy="4114800"/>
+          </a:xfrm>
+          <a:prstGeom prst="rect">
+            <a:avLst/>
+          </a:prstGeom>
+        </p:spPr>
+        <p:txBody>
+          <a:bodyPr anchorCtr="0" anchor="t" bIns="91425" lIns="91425" spcFirstLastPara="1" rIns="91425" wrap="square" tIns="91425">
+            <a:noAutofit/>
+          </a:bodyPr>
+          <a:lstStyle/>
+          <a:p>
+            <a:pPr indent="0" lvl="0" marL="0" rtl="0" algn="l">
+              <a:lnSpc>
+                <a:spcPct val="115000"/>
+              </a:lnSpc>
+              <a:spcBef>
+                <a:spcPts val="0"/>
+              </a:spcBef>
+              <a:spcAft>
+                <a:spcPts val="0"/>
+              </a:spcAft>
+              <a:buNone/>
+            </a:pPr>
+            <a:r>
+              <a:t/>
+            </a:r>
+            <a:endParaRPr sz="700">
+              <a:solidFill>
+                <a:schemeClr val="dk1"/>
+              </a:solidFill>
+            </a:endParaRPr>
+          </a:p>
+          <a:p>
+            <a:pPr indent="0" lvl="0" marL="0" rtl="0" algn="l">
+              <a:lnSpc>
+                <a:spcPct val="115000"/>
+              </a:lnSpc>
+              <a:spcBef>
+                <a:spcPts val="0"/>
+              </a:spcBef>
+              <a:spcAft>
+                <a:spcPts val="0"/>
+              </a:spcAft>
+              <a:buNone/>
+            </a:pPr>
+            <a:r>
+              <a:t/>
+            </a:r>
+            <a:endParaRPr sz="700">
+              <a:solidFill>
+                <a:schemeClr val="dk1"/>
+              </a:solidFill>
+            </a:endParaRPr>
+          </a:p>
+          <a:p>
+            <a:pPr indent="0" lvl="0" marL="0" rtl="0" algn="l">
+              <a:lnSpc>
+                <a:spcPct val="115000"/>
+              </a:lnSpc>
+              <a:spcBef>
+                <a:spcPts val="0"/>
+              </a:spcBef>
+              <a:spcAft>
+                <a:spcPts val="0"/>
+              </a:spcAft>
+              <a:buNone/>
+            </a:pPr>
+            <a:r>
+              <a:t/>
+            </a:r>
+            <a:endParaRPr sz="700">
+              <a:solidFill>
+                <a:schemeClr val="dk1"/>
+              </a:solidFill>
+            </a:endParaRPr>
+          </a:p>
+          <a:p>
+            <a:pPr indent="0" lvl="0" marL="0" rtl="0" algn="l">
+              <a:lnSpc>
+                <a:spcPct val="115000"/>
+              </a:lnSpc>
+              <a:spcBef>
+                <a:spcPts val="0"/>
+              </a:spcBef>
+              <a:spcAft>
+                <a:spcPts val="0"/>
+              </a:spcAft>
+              <a:buNone/>
+            </a:pPr>
+            <a:r>
+              <a:t/>
+            </a:r>
+            <a:endParaRPr sz="700">
+              <a:solidFill>
+                <a:schemeClr val="dk1"/>
+              </a:solidFill>
+            </a:endParaRPr>
+          </a:p>
+          <a:p>
+            <a:pPr indent="0" lvl="0" marL="0" rtl="0" algn="l">
+              <a:spcBef>
+                <a:spcPts val="0"/>
+              </a:spcBef>
+              <a:spcAft>
+                <a:spcPts val="0"/>
+              </a:spcAft>
+              <a:buNone/>
+            </a:pPr>
+            <a:r>
+              <a:t/>
+            </a:r>
+            <a:endParaRPr/>
+          </a:p>
+        </p:txBody>
+      </p:sp>
+    </p:spTree>
+  </p:cSld>
+  <p:clrMapOvr>
+    <a:masterClrMapping/>
+  </p:clrMapOvr>
+</p:notes>
+</file>
+
+<file path=ppt/notesSlides/notesSlide6.xml><?xml version="1.0" encoding="utf-8"?>
+<p:notes xmlns:a="http://schemas.openxmlformats.org/drawingml/2006/main" xmlns:r="http://schemas.openxmlformats.org/officeDocument/2006/relationships" xmlns:mc="http://schemas.openxmlformats.org/markup-compatibility/2006" xmlns:mv="urn:schemas-microsoft-com:mac:vml" xmlns:p="http://schemas.openxmlformats.org/presentationml/2006/main" xmlns:c="http://schemas.openxmlformats.org/drawingml/2006/chart" xmlns:dgm="http://schemas.openxmlformats.org/drawingml/2006/diagram" xmlns:o="urn:schemas-microsoft-com:office:office" xmlns:v="urn:schemas-microsoft-com:vml" xmlns:pvml="urn:schemas-microsoft-com:office:powerpoint" xmlns:com="http://schemas.openxmlformats.org/drawingml/2006/compatibility" xmlns:p14="http://schemas.microsoft.com/office/powerpoint/2010/main" xmlns:p15="http://schemas.microsoft.com/office/powerpoint/2012/main" xmlns:ahyp="http://schemas.microsoft.com/office/drawing/2018/hyperlinkcolor" showMasterPhAnim="0" showMasterSp="0">
+  <p:cSld>
+    <p:spTree>
+      <p:nvGrpSpPr>
+        <p:cNvPr id="135" name="Shape 135"/>
+        <p:cNvGrpSpPr/>
+        <p:nvPr/>
+      </p:nvGrpSpPr>
+      <p:grpSpPr>
+        <a:xfrm>
+          <a:off x="0" y="0"/>
+          <a:ext cx="0" cy="0"/>
+          <a:chOff x="0" y="0"/>
+          <a:chExt cx="0" cy="0"/>
+        </a:xfrm>
+      </p:grpSpPr>
+      <p:sp>
+        <p:nvSpPr>
+          <p:cNvPr id="136" name="Google Shape;136;g129cff206dc_0_0:notes"/>
+          <p:cNvSpPr/>
+          <p:nvPr>
+            <p:ph idx="2" type="sldImg"/>
+          </p:nvPr>
+        </p:nvSpPr>
+        <p:spPr>
+          <a:xfrm>
+            <a:off x="381188" y="685800"/>
+            <a:ext cx="6096300" cy="3429000"/>
+          </a:xfrm>
+          <a:custGeom>
+            <a:rect b="b" l="l" r="r" t="t"/>
+            <a:pathLst>
+              <a:path extrusionOk="0" h="120000" w="120000">
+                <a:moveTo>
+                  <a:pt x="0" y="0"/>
+                </a:moveTo>
+                <a:lnTo>
+                  <a:pt x="120000" y="0"/>
+                </a:lnTo>
+                <a:lnTo>
+                  <a:pt x="120000" y="120000"/>
+                </a:lnTo>
+                <a:lnTo>
+                  <a:pt x="0" y="120000"/>
+                </a:lnTo>
+                <a:close/>
+              </a:path>
+            </a:pathLst>
+          </a:custGeom>
+        </p:spPr>
+      </p:sp>
+      <p:sp>
+        <p:nvSpPr>
+          <p:cNvPr id="137" name="Google Shape;137;g129cff206dc_0_0:notes"/>
           <p:cNvSpPr txBox="1"/>
           <p:nvPr>
             <p:ph idx="1" type="body"/>
@@ -1373,12 +1750,12 @@
 </p:notes>
 </file>
 
-<file path=ppt/notesSlides/notesSlide5.xml><?xml version="1.0" encoding="utf-8"?>
+<file path=ppt/notesSlides/notesSlide7.xml><?xml version="1.0" encoding="utf-8"?>
 <p:notes xmlns:a="http://schemas.openxmlformats.org/drawingml/2006/main" xmlns:r="http://schemas.openxmlformats.org/officeDocument/2006/relationships" xmlns:mc="http://schemas.openxmlformats.org/markup-compatibility/2006" xmlns:mv="urn:schemas-microsoft-com:mac:vml" xmlns:p="http://schemas.openxmlformats.org/presentationml/2006/main" xmlns:c="http://schemas.openxmlformats.org/drawingml/2006/chart" xmlns:dgm="http://schemas.openxmlformats.org/drawingml/2006/diagram" xmlns:o="urn:schemas-microsoft-com:office:office" xmlns:v="urn:schemas-microsoft-com:vml" xmlns:pvml="urn:schemas-microsoft-com:office:powerpoint" xmlns:com="http://schemas.openxmlformats.org/drawingml/2006/compatibility" xmlns:p14="http://schemas.microsoft.com/office/powerpoint/2010/main" xmlns:p15="http://schemas.microsoft.com/office/powerpoint/2012/main" xmlns:ahyp="http://schemas.microsoft.com/office/drawing/2018/hyperlinkcolor" showMasterPhAnim="0" showMasterSp="0">
   <p:cSld>
     <p:spTree>
       <p:nvGrpSpPr>
-        <p:cNvPr id="128" name="Shape 128"/>
+        <p:cNvPr id="144" name="Shape 144"/>
         <p:cNvGrpSpPr/>
         <p:nvPr/>
       </p:nvGrpSpPr>
@@ -1392,7 +1769,7 @@
       </p:grpSpPr>
       <p:sp>
         <p:nvSpPr>
-          <p:cNvPr id="129" name="Google Shape;129;g1270fbf5b79_0_106:notes"/>
+          <p:cNvPr id="145" name="Google Shape;145;g1270fbf5b79_0_106:notes"/>
           <p:cNvSpPr/>
           <p:nvPr>
             <p:ph idx="2" type="sldImg"/>
@@ -1427,7 +1804,7 @@
       </p:sp>
       <p:sp>
         <p:nvSpPr>
-          <p:cNvPr id="130" name="Google Shape;130;g1270fbf5b79_0_106:notes"/>
+          <p:cNvPr id="146" name="Google Shape;146;g1270fbf5b79_0_106:notes"/>
           <p:cNvSpPr txBox="1"/>
           <p:nvPr>
             <p:ph idx="1" type="body"/>
@@ -1560,12 +1937,12 @@
 </p:notes>
 </file>
 
-<file path=ppt/notesSlides/notesSlide6.xml><?xml version="1.0" encoding="utf-8"?>
+<file path=ppt/notesSlides/notesSlide8.xml><?xml version="1.0" encoding="utf-8"?>
 <p:notes xmlns:a="http://schemas.openxmlformats.org/drawingml/2006/main" xmlns:r="http://schemas.openxmlformats.org/officeDocument/2006/relationships" xmlns:mc="http://schemas.openxmlformats.org/markup-compatibility/2006" xmlns:mv="urn:schemas-microsoft-com:mac:vml" xmlns:p="http://schemas.openxmlformats.org/presentationml/2006/main" xmlns:c="http://schemas.openxmlformats.org/drawingml/2006/chart" xmlns:dgm="http://schemas.openxmlformats.org/drawingml/2006/diagram" xmlns:o="urn:schemas-microsoft-com:office:office" xmlns:v="urn:schemas-microsoft-com:vml" xmlns:pvml="urn:schemas-microsoft-com:office:powerpoint" xmlns:com="http://schemas.openxmlformats.org/drawingml/2006/compatibility" xmlns:p14="http://schemas.microsoft.com/office/powerpoint/2010/main" xmlns:p15="http://schemas.microsoft.com/office/powerpoint/2012/main" xmlns:ahyp="http://schemas.microsoft.com/office/drawing/2018/hyperlinkcolor" showMasterPhAnim="0" showMasterSp="0">
   <p:cSld>
     <p:spTree>
       <p:nvGrpSpPr>
-        <p:cNvPr id="136" name="Shape 136"/>
+        <p:cNvPr id="152" name="Shape 152"/>
         <p:cNvGrpSpPr/>
         <p:nvPr/>
       </p:nvGrpSpPr>
@@ -1579,7 +1956,7 @@
       </p:grpSpPr>
       <p:sp>
         <p:nvSpPr>
-          <p:cNvPr id="137" name="Google Shape;137;g129cff206dc_2_0:notes"/>
+          <p:cNvPr id="153" name="Google Shape;153;g12c01152a48_0_17:notes"/>
           <p:cNvSpPr/>
           <p:nvPr>
             <p:ph idx="2" type="sldImg"/>
@@ -1614,7 +1991,194 @@
       </p:sp>
       <p:sp>
         <p:nvSpPr>
-          <p:cNvPr id="138" name="Google Shape;138;g129cff206dc_2_0:notes"/>
+          <p:cNvPr id="154" name="Google Shape;154;g12c01152a48_0_17:notes"/>
+          <p:cNvSpPr txBox="1"/>
+          <p:nvPr>
+            <p:ph idx="1" type="body"/>
+          </p:nvPr>
+        </p:nvSpPr>
+        <p:spPr>
+          <a:xfrm>
+            <a:off x="685800" y="4343400"/>
+            <a:ext cx="5486400" cy="4114800"/>
+          </a:xfrm>
+          <a:prstGeom prst="rect">
+            <a:avLst/>
+          </a:prstGeom>
+        </p:spPr>
+        <p:txBody>
+          <a:bodyPr anchorCtr="0" anchor="t" bIns="91425" lIns="91425" spcFirstLastPara="1" rIns="91425" wrap="square" tIns="91425">
+            <a:noAutofit/>
+          </a:bodyPr>
+          <a:lstStyle/>
+          <a:p>
+            <a:pPr indent="0" lvl="0" marL="0" rtl="0" algn="l">
+              <a:lnSpc>
+                <a:spcPct val="115000"/>
+              </a:lnSpc>
+              <a:spcBef>
+                <a:spcPts val="0"/>
+              </a:spcBef>
+              <a:spcAft>
+                <a:spcPts val="0"/>
+              </a:spcAft>
+              <a:buNone/>
+            </a:pPr>
+            <a:r>
+              <a:t/>
+            </a:r>
+            <a:endParaRPr sz="700">
+              <a:solidFill>
+                <a:schemeClr val="dk1"/>
+              </a:solidFill>
+            </a:endParaRPr>
+          </a:p>
+          <a:p>
+            <a:pPr indent="0" lvl="0" marL="0" rtl="0" algn="l">
+              <a:lnSpc>
+                <a:spcPct val="115000"/>
+              </a:lnSpc>
+              <a:spcBef>
+                <a:spcPts val="0"/>
+              </a:spcBef>
+              <a:spcAft>
+                <a:spcPts val="0"/>
+              </a:spcAft>
+              <a:buNone/>
+            </a:pPr>
+            <a:r>
+              <a:t/>
+            </a:r>
+            <a:endParaRPr sz="700">
+              <a:solidFill>
+                <a:schemeClr val="dk1"/>
+              </a:solidFill>
+            </a:endParaRPr>
+          </a:p>
+          <a:p>
+            <a:pPr indent="0" lvl="0" marL="0" rtl="0" algn="l">
+              <a:lnSpc>
+                <a:spcPct val="115000"/>
+              </a:lnSpc>
+              <a:spcBef>
+                <a:spcPts val="0"/>
+              </a:spcBef>
+              <a:spcAft>
+                <a:spcPts val="0"/>
+              </a:spcAft>
+              <a:buNone/>
+            </a:pPr>
+            <a:r>
+              <a:t/>
+            </a:r>
+            <a:endParaRPr sz="700">
+              <a:solidFill>
+                <a:schemeClr val="dk1"/>
+              </a:solidFill>
+            </a:endParaRPr>
+          </a:p>
+          <a:p>
+            <a:pPr indent="0" lvl="0" marL="0" rtl="0" algn="l">
+              <a:lnSpc>
+                <a:spcPct val="115000"/>
+              </a:lnSpc>
+              <a:spcBef>
+                <a:spcPts val="0"/>
+              </a:spcBef>
+              <a:spcAft>
+                <a:spcPts val="0"/>
+              </a:spcAft>
+              <a:buNone/>
+            </a:pPr>
+            <a:r>
+              <a:t/>
+            </a:r>
+            <a:endParaRPr sz="700">
+              <a:solidFill>
+                <a:schemeClr val="dk1"/>
+              </a:solidFill>
+            </a:endParaRPr>
+          </a:p>
+          <a:p>
+            <a:pPr indent="0" lvl="0" marL="0" rtl="0" algn="l">
+              <a:spcBef>
+                <a:spcPts val="0"/>
+              </a:spcBef>
+              <a:spcAft>
+                <a:spcPts val="0"/>
+              </a:spcAft>
+              <a:buNone/>
+            </a:pPr>
+            <a:r>
+              <a:t/>
+            </a:r>
+            <a:endParaRPr/>
+          </a:p>
+        </p:txBody>
+      </p:sp>
+    </p:spTree>
+  </p:cSld>
+  <p:clrMapOvr>
+    <a:masterClrMapping/>
+  </p:clrMapOvr>
+</p:notes>
+</file>
+
+<file path=ppt/notesSlides/notesSlide9.xml><?xml version="1.0" encoding="utf-8"?>
+<p:notes xmlns:a="http://schemas.openxmlformats.org/drawingml/2006/main" xmlns:r="http://schemas.openxmlformats.org/officeDocument/2006/relationships" xmlns:mc="http://schemas.openxmlformats.org/markup-compatibility/2006" xmlns:mv="urn:schemas-microsoft-com:mac:vml" xmlns:p="http://schemas.openxmlformats.org/presentationml/2006/main" xmlns:c="http://schemas.openxmlformats.org/drawingml/2006/chart" xmlns:dgm="http://schemas.openxmlformats.org/drawingml/2006/diagram" xmlns:o="urn:schemas-microsoft-com:office:office" xmlns:v="urn:schemas-microsoft-com:vml" xmlns:pvml="urn:schemas-microsoft-com:office:powerpoint" xmlns:com="http://schemas.openxmlformats.org/drawingml/2006/compatibility" xmlns:p14="http://schemas.microsoft.com/office/powerpoint/2010/main" xmlns:p15="http://schemas.microsoft.com/office/powerpoint/2012/main" xmlns:ahyp="http://schemas.microsoft.com/office/drawing/2018/hyperlinkcolor" showMasterPhAnim="0" showMasterSp="0">
+  <p:cSld>
+    <p:spTree>
+      <p:nvGrpSpPr>
+        <p:cNvPr id="160" name="Shape 160"/>
+        <p:cNvGrpSpPr/>
+        <p:nvPr/>
+      </p:nvGrpSpPr>
+      <p:grpSpPr>
+        <a:xfrm>
+          <a:off x="0" y="0"/>
+          <a:ext cx="0" cy="0"/>
+          <a:chOff x="0" y="0"/>
+          <a:chExt cx="0" cy="0"/>
+        </a:xfrm>
+      </p:grpSpPr>
+      <p:sp>
+        <p:nvSpPr>
+          <p:cNvPr id="161" name="Google Shape;161;g129cff206dc_2_0:notes"/>
+          <p:cNvSpPr/>
+          <p:nvPr>
+            <p:ph idx="2" type="sldImg"/>
+          </p:nvPr>
+        </p:nvSpPr>
+        <p:spPr>
+          <a:xfrm>
+            <a:off x="381188" y="685800"/>
+            <a:ext cx="6096300" cy="3429000"/>
+          </a:xfrm>
+          <a:custGeom>
+            <a:rect b="b" l="l" r="r" t="t"/>
+            <a:pathLst>
+              <a:path extrusionOk="0" h="120000" w="120000">
+                <a:moveTo>
+                  <a:pt x="0" y="0"/>
+                </a:moveTo>
+                <a:lnTo>
+                  <a:pt x="120000" y="0"/>
+                </a:lnTo>
+                <a:lnTo>
+                  <a:pt x="120000" y="120000"/>
+                </a:lnTo>
+                <a:lnTo>
+                  <a:pt x="0" y="120000"/>
+                </a:lnTo>
+                <a:close/>
+              </a:path>
+            </a:pathLst>
+          </a:custGeom>
+        </p:spPr>
+      </p:sp>
+      <p:sp>
+        <p:nvSpPr>
+          <p:cNvPr id="162" name="Google Shape;162;g129cff206dc_2_0:notes"/>
           <p:cNvSpPr txBox="1"/>
           <p:nvPr>
             <p:ph idx="1" type="body"/>
@@ -12030,9 +12594,57 @@
           <a:chExt cx="0" cy="0"/>
         </a:xfrm>
       </p:grpSpPr>
+      <p:sp>
+        <p:nvSpPr>
+          <p:cNvPr id="123" name="Google Shape;123;p28"/>
+          <p:cNvSpPr txBox="1"/>
+          <p:nvPr>
+            <p:ph type="title"/>
+          </p:nvPr>
+        </p:nvSpPr>
+        <p:spPr>
+          <a:xfrm>
+            <a:off x="311700" y="109850"/>
+            <a:ext cx="8520600" cy="607800"/>
+          </a:xfrm>
+          <a:prstGeom prst="rect">
+            <a:avLst/>
+          </a:prstGeom>
+        </p:spPr>
+        <p:txBody>
+          <a:bodyPr anchorCtr="0" anchor="t" bIns="91425" lIns="91425" spcFirstLastPara="1" rIns="91425" wrap="square" tIns="91425">
+            <a:normAutofit fontScale="90000"/>
+          </a:bodyPr>
+          <a:lstStyle/>
+          <a:p>
+            <a:pPr indent="0" lvl="0" marL="0" rtl="0" algn="l">
+              <a:spcBef>
+                <a:spcPts val="0"/>
+              </a:spcBef>
+              <a:spcAft>
+                <a:spcPts val="0"/>
+              </a:spcAft>
+              <a:buNone/>
+            </a:pPr>
+            <a:r>
+              <a:rPr lang="en">
+                <a:solidFill>
+                  <a:srgbClr val="4A86E8"/>
+                </a:solidFill>
+              </a:rPr>
+              <a:t>Participants</a:t>
+            </a:r>
+            <a:endParaRPr>
+              <a:solidFill>
+                <a:srgbClr val="4A86E8"/>
+              </a:solidFill>
+            </a:endParaRPr>
+          </a:p>
+        </p:txBody>
+      </p:sp>
       <p:pic>
         <p:nvPicPr>
-          <p:cNvPr id="123" name="Google Shape;123;p28"/>
+          <p:cNvPr id="124" name="Google Shape;124;p28"/>
           <p:cNvPicPr preferRelativeResize="0"/>
           <p:nvPr/>
         </p:nvPicPr>
@@ -12060,7 +12672,7 @@
       </p:pic>
       <p:sp>
         <p:nvSpPr>
-          <p:cNvPr id="124" name="Google Shape;124;p28"/>
+          <p:cNvPr id="125" name="Google Shape;125;p28"/>
           <p:cNvSpPr txBox="1"/>
           <p:nvPr>
             <p:ph idx="12" type="sldNum"/>
@@ -12068,7 +12680,7 @@
         </p:nvSpPr>
         <p:spPr>
           <a:xfrm>
-            <a:off x="8" y="4710292"/>
+            <a:off x="8" y="4730092"/>
             <a:ext cx="548700" cy="393600"/>
           </a:xfrm>
           <a:prstGeom prst="rect">
@@ -12114,231 +12726,24 @@
           </a:p>
         </p:txBody>
       </p:sp>
-      <p:sp>
-        <p:nvSpPr>
-          <p:cNvPr id="125" name="Google Shape;125;p28"/>
-          <p:cNvSpPr txBox="1"/>
-          <p:nvPr/>
-        </p:nvSpPr>
-        <p:spPr>
-          <a:xfrm>
-            <a:off x="3234125" y="764400"/>
-            <a:ext cx="5135700" cy="3840300"/>
-          </a:xfrm>
-          <a:prstGeom prst="rect">
-            <a:avLst/>
-          </a:prstGeom>
-          <a:noFill/>
-          <a:ln>
-            <a:noFill/>
-          </a:ln>
-        </p:spPr>
-        <p:txBody>
-          <a:bodyPr anchorCtr="0" anchor="t" bIns="91425" lIns="91425" spcFirstLastPara="1" rIns="91425" wrap="square" tIns="91425">
-            <a:spAutoFit/>
-          </a:bodyPr>
-          <a:lstStyle/>
-          <a:p>
-            <a:pPr indent="-349250" lvl="0" marL="457200" rtl="0" algn="l">
-              <a:lnSpc>
-                <a:spcPct val="115000"/>
-              </a:lnSpc>
-              <a:spcBef>
-                <a:spcPts val="0"/>
-              </a:spcBef>
-              <a:spcAft>
-                <a:spcPts val="0"/>
-              </a:spcAft>
-              <a:buSzPts val="1900"/>
-              <a:buChar char="●"/>
-            </a:pPr>
-            <a:r>
-              <a:rPr b="1" lang="en" sz="1900"/>
-              <a:t>Day 1</a:t>
-            </a:r>
-            <a:r>
-              <a:rPr lang="en" sz="1900"/>
-              <a:t>: Introduction to AI/ML and Python ML ecosystem, </a:t>
-            </a:r>
-            <a:r>
-              <a:rPr lang="en" sz="1900">
-                <a:solidFill>
-                  <a:schemeClr val="dk1"/>
-                </a:solidFill>
-              </a:rPr>
-              <a:t>AI/ML applications in computational biology and chemistry</a:t>
-            </a:r>
-            <a:endParaRPr sz="1900"/>
-          </a:p>
-          <a:p>
-            <a:pPr indent="-349250" lvl="0" marL="457200" rtl="0" algn="l">
-              <a:lnSpc>
-                <a:spcPct val="115000"/>
-              </a:lnSpc>
-              <a:spcBef>
-                <a:spcPts val="0"/>
-              </a:spcBef>
-              <a:spcAft>
-                <a:spcPts val="0"/>
-              </a:spcAft>
-              <a:buSzPts val="1900"/>
-              <a:buChar char="●"/>
-            </a:pPr>
-            <a:r>
-              <a:rPr b="1" lang="en" sz="1900"/>
-              <a:t>Day 2</a:t>
-            </a:r>
-            <a:r>
-              <a:rPr lang="en" sz="1900"/>
-              <a:t>: Data collection and data preparation, </a:t>
-            </a:r>
-            <a:r>
-              <a:rPr lang="en" sz="1900">
-                <a:solidFill>
-                  <a:schemeClr val="dk1"/>
-                </a:solidFill>
-              </a:rPr>
-              <a:t>data readiness for AI/ML checklist</a:t>
-            </a:r>
-            <a:endParaRPr sz="1900"/>
-          </a:p>
-          <a:p>
-            <a:pPr indent="-349250" lvl="0" marL="457200" rtl="0" algn="l">
-              <a:lnSpc>
-                <a:spcPct val="115000"/>
-              </a:lnSpc>
-              <a:spcBef>
-                <a:spcPts val="0"/>
-              </a:spcBef>
-              <a:spcAft>
-                <a:spcPts val="0"/>
-              </a:spcAft>
-              <a:buSzPts val="1900"/>
-              <a:buChar char="●"/>
-            </a:pPr>
-            <a:r>
-              <a:rPr b="1" lang="en" sz="1900"/>
-              <a:t>Day 3</a:t>
-            </a:r>
-            <a:r>
-              <a:rPr lang="en" sz="1900"/>
-              <a:t>: Feature selection, feature engineering and feature scaling</a:t>
-            </a:r>
-            <a:endParaRPr sz="1900"/>
-          </a:p>
-          <a:p>
-            <a:pPr indent="-349250" lvl="0" marL="457200" rtl="0" algn="l">
-              <a:lnSpc>
-                <a:spcPct val="115000"/>
-              </a:lnSpc>
-              <a:spcBef>
-                <a:spcPts val="0"/>
-              </a:spcBef>
-              <a:spcAft>
-                <a:spcPts val="0"/>
-              </a:spcAft>
-              <a:buSzPts val="1900"/>
-              <a:buChar char="●"/>
-            </a:pPr>
-            <a:r>
-              <a:rPr b="1" lang="en" sz="1900"/>
-              <a:t>Day 4</a:t>
-            </a:r>
-            <a:r>
-              <a:rPr lang="en" sz="1900"/>
-              <a:t>: ML model, from its selection to its training, evaluation and tuning</a:t>
-            </a:r>
-            <a:endParaRPr sz="1900"/>
-          </a:p>
-          <a:p>
-            <a:pPr indent="-349250" lvl="0" marL="457200" rtl="0" algn="l">
-              <a:lnSpc>
-                <a:spcPct val="115000"/>
-              </a:lnSpc>
-              <a:spcBef>
-                <a:spcPts val="0"/>
-              </a:spcBef>
-              <a:spcAft>
-                <a:spcPts val="0"/>
-              </a:spcAft>
-              <a:buSzPts val="1900"/>
-              <a:buChar char="●"/>
-            </a:pPr>
-            <a:r>
-              <a:rPr b="1" lang="en" sz="1900"/>
-              <a:t>Day 5</a:t>
-            </a:r>
-            <a:r>
-              <a:rPr lang="en" sz="1900"/>
-              <a:t>: Introduction to deep learning</a:t>
-            </a:r>
-            <a:endParaRPr sz="1900"/>
-          </a:p>
-        </p:txBody>
-      </p:sp>
-      <p:sp>
-        <p:nvSpPr>
-          <p:cNvPr id="126" name="Google Shape;126;p28"/>
-          <p:cNvSpPr txBox="1"/>
-          <p:nvPr/>
-        </p:nvSpPr>
-        <p:spPr>
-          <a:xfrm>
-            <a:off x="3234125" y="0"/>
-            <a:ext cx="5910000" cy="615600"/>
-          </a:xfrm>
-          <a:prstGeom prst="rect">
-            <a:avLst/>
-          </a:prstGeom>
-          <a:noFill/>
-          <a:ln>
-            <a:noFill/>
-          </a:ln>
-        </p:spPr>
-        <p:txBody>
-          <a:bodyPr anchorCtr="0" anchor="t" bIns="91425" lIns="91425" spcFirstLastPara="1" rIns="91425" wrap="square" tIns="91425">
-            <a:spAutoFit/>
-          </a:bodyPr>
-          <a:lstStyle/>
-          <a:p>
-            <a:pPr indent="0" lvl="0" marL="0" rtl="0" algn="l">
-              <a:spcBef>
-                <a:spcPts val="0"/>
-              </a:spcBef>
-              <a:spcAft>
-                <a:spcPts val="0"/>
-              </a:spcAft>
-              <a:buNone/>
-            </a:pPr>
-            <a:r>
-              <a:rPr lang="en" sz="2800">
-                <a:solidFill>
-                  <a:srgbClr val="4A86E8"/>
-                </a:solidFill>
-              </a:rPr>
-              <a:t>Workshop Outcome and agenda</a:t>
-            </a:r>
-            <a:endParaRPr/>
-          </a:p>
-        </p:txBody>
-      </p:sp>
       <p:pic>
         <p:nvPicPr>
-          <p:cNvPr id="127" name="Google Shape;127;p28"/>
+          <p:cNvPr descr="Forms response chart. Question title: Status (Which of these best describes you?). Number of responses: 35 responses." id="126" name="Google Shape;126;p28" title="Status (Which of these best describes you?)"/>
           <p:cNvPicPr preferRelativeResize="0"/>
           <p:nvPr/>
         </p:nvPicPr>
-        <p:blipFill rotWithShape="1">
+        <p:blipFill>
           <a:blip r:embed="rId4">
             <a:alphaModFix/>
           </a:blip>
-          <a:srcRect b="7380" l="0" r="0" t="3912"/>
-          <a:stretch/>
+          <a:stretch>
+            <a:fillRect/>
+          </a:stretch>
         </p:blipFill>
         <p:spPr>
           <a:xfrm>
-            <a:off x="149075" y="0"/>
-            <a:ext cx="2787950" cy="5143500"/>
+            <a:off x="393650" y="870050"/>
+            <a:ext cx="8024223" cy="3377374"/>
           </a:xfrm>
           <a:prstGeom prst="rect">
             <a:avLst/>
@@ -12362,7 +12767,7 @@
   <p:cSld>
     <p:spTree>
       <p:nvGrpSpPr>
-        <p:cNvPr id="131" name="Shape 131"/>
+        <p:cNvPr id="130" name="Shape 130"/>
         <p:cNvGrpSpPr/>
         <p:nvPr/>
       </p:nvGrpSpPr>
@@ -12374,6 +12779,54 @@
           <a:chExt cx="0" cy="0"/>
         </a:xfrm>
       </p:grpSpPr>
+      <p:sp>
+        <p:nvSpPr>
+          <p:cNvPr id="131" name="Google Shape;131;p29"/>
+          <p:cNvSpPr txBox="1"/>
+          <p:nvPr>
+            <p:ph type="title"/>
+          </p:nvPr>
+        </p:nvSpPr>
+        <p:spPr>
+          <a:xfrm>
+            <a:off x="311700" y="109850"/>
+            <a:ext cx="8520600" cy="607800"/>
+          </a:xfrm>
+          <a:prstGeom prst="rect">
+            <a:avLst/>
+          </a:prstGeom>
+        </p:spPr>
+        <p:txBody>
+          <a:bodyPr anchorCtr="0" anchor="t" bIns="91425" lIns="91425" spcFirstLastPara="1" rIns="91425" wrap="square" tIns="91425">
+            <a:normAutofit fontScale="90000"/>
+          </a:bodyPr>
+          <a:lstStyle/>
+          <a:p>
+            <a:pPr indent="0" lvl="0" marL="0" rtl="0" algn="l">
+              <a:spcBef>
+                <a:spcPts val="0"/>
+              </a:spcBef>
+              <a:spcAft>
+                <a:spcPts val="0"/>
+              </a:spcAft>
+              <a:buNone/>
+            </a:pPr>
+            <a:r>
+              <a:rPr lang="en">
+                <a:solidFill>
+                  <a:srgbClr val="4A86E8"/>
+                </a:solidFill>
+              </a:rPr>
+              <a:t>AI/ML Experience</a:t>
+            </a:r>
+            <a:endParaRPr>
+              <a:solidFill>
+                <a:srgbClr val="4A86E8"/>
+              </a:solidFill>
+            </a:endParaRPr>
+          </a:p>
+        </p:txBody>
+      </p:sp>
       <p:pic>
         <p:nvPicPr>
           <p:cNvPr id="132" name="Google Shape;132;p29"/>
@@ -12407,6 +12860,487 @@
           <p:cNvPr id="133" name="Google Shape;133;p29"/>
           <p:cNvSpPr txBox="1"/>
           <p:nvPr>
+            <p:ph idx="12" type="sldNum"/>
+          </p:nvPr>
+        </p:nvSpPr>
+        <p:spPr>
+          <a:xfrm>
+            <a:off x="8" y="4730092"/>
+            <a:ext cx="548700" cy="393600"/>
+          </a:xfrm>
+          <a:prstGeom prst="rect">
+            <a:avLst/>
+          </a:prstGeom>
+        </p:spPr>
+        <p:txBody>
+          <a:bodyPr anchorCtr="0" anchor="ctr" bIns="91425" lIns="91425" spcFirstLastPara="1" rIns="91425" wrap="square" tIns="91425">
+            <a:normAutofit/>
+          </a:bodyPr>
+          <a:lstStyle/>
+          <a:p>
+            <a:pPr indent="0" lvl="0" marL="0" rtl="0" algn="r">
+              <a:spcBef>
+                <a:spcPts val="0"/>
+              </a:spcBef>
+              <a:spcAft>
+                <a:spcPts val="0"/>
+              </a:spcAft>
+              <a:buNone/>
+            </a:pPr>
+            <a:fld id="{00000000-1234-1234-1234-123412341234}" type="slidenum">
+              <a:rPr lang="en">
+                <a:solidFill>
+                  <a:schemeClr val="lt1"/>
+                </a:solidFill>
+                <a:latin typeface="Arial"/>
+                <a:ea typeface="Arial"/>
+                <a:cs typeface="Arial"/>
+                <a:sym typeface="Arial"/>
+              </a:rPr>
+              <a:t>‹#›</a:t>
+            </a:fld>
+            <a:endParaRPr>
+              <a:solidFill>
+                <a:schemeClr val="lt1"/>
+              </a:solidFill>
+              <a:latin typeface="Arial"/>
+              <a:ea typeface="Arial"/>
+              <a:cs typeface="Arial"/>
+              <a:sym typeface="Arial"/>
+            </a:endParaRPr>
+          </a:p>
+        </p:txBody>
+      </p:sp>
+      <p:pic>
+        <p:nvPicPr>
+          <p:cNvPr descr="Forms response chart. Question title: What is your level of AI/ML experience?. Number of responses: 35 responses." id="134" name="Google Shape;134;p29" title="What is your level of AI/ML experience?"/>
+          <p:cNvPicPr preferRelativeResize="0"/>
+          <p:nvPr/>
+        </p:nvPicPr>
+        <p:blipFill>
+          <a:blip r:embed="rId4">
+            <a:alphaModFix/>
+          </a:blip>
+          <a:stretch>
+            <a:fillRect/>
+          </a:stretch>
+        </p:blipFill>
+        <p:spPr>
+          <a:xfrm>
+            <a:off x="892988" y="822063"/>
+            <a:ext cx="7358024" cy="3499375"/>
+          </a:xfrm>
+          <a:prstGeom prst="rect">
+            <a:avLst/>
+          </a:prstGeom>
+          <a:noFill/>
+          <a:ln>
+            <a:noFill/>
+          </a:ln>
+        </p:spPr>
+      </p:pic>
+    </p:spTree>
+  </p:cSld>
+  <p:clrMapOvr>
+    <a:masterClrMapping/>
+  </p:clrMapOvr>
+</p:sld>
+</file>
+
+<file path=ppt/slides/slide6.xml><?xml version="1.0" encoding="utf-8"?>
+<p:sld xmlns:a="http://schemas.openxmlformats.org/drawingml/2006/main" xmlns:r="http://schemas.openxmlformats.org/officeDocument/2006/relationships" xmlns:mc="http://schemas.openxmlformats.org/markup-compatibility/2006" xmlns:mv="urn:schemas-microsoft-com:mac:vml" xmlns:p="http://schemas.openxmlformats.org/presentationml/2006/main" xmlns:c="http://schemas.openxmlformats.org/drawingml/2006/chart" xmlns:dgm="http://schemas.openxmlformats.org/drawingml/2006/diagram" xmlns:o="urn:schemas-microsoft-com:office:office" xmlns:v="urn:schemas-microsoft-com:vml" xmlns:pvml="urn:schemas-microsoft-com:office:powerpoint" xmlns:com="http://schemas.openxmlformats.org/drawingml/2006/compatibility" xmlns:p14="http://schemas.microsoft.com/office/powerpoint/2010/main" xmlns:p15="http://schemas.microsoft.com/office/powerpoint/2012/main" xmlns:ahyp="http://schemas.microsoft.com/office/drawing/2018/hyperlinkcolor">
+  <p:cSld>
+    <p:spTree>
+      <p:nvGrpSpPr>
+        <p:cNvPr id="138" name="Shape 138"/>
+        <p:cNvGrpSpPr/>
+        <p:nvPr/>
+      </p:nvGrpSpPr>
+      <p:grpSpPr>
+        <a:xfrm>
+          <a:off x="0" y="0"/>
+          <a:ext cx="0" cy="0"/>
+          <a:chOff x="0" y="0"/>
+          <a:chExt cx="0" cy="0"/>
+        </a:xfrm>
+      </p:grpSpPr>
+      <p:pic>
+        <p:nvPicPr>
+          <p:cNvPr id="139" name="Google Shape;139;p30"/>
+          <p:cNvPicPr preferRelativeResize="0"/>
+          <p:nvPr/>
+        </p:nvPicPr>
+        <p:blipFill>
+          <a:blip r:embed="rId3">
+            <a:alphaModFix/>
+          </a:blip>
+          <a:stretch>
+            <a:fillRect/>
+          </a:stretch>
+        </p:blipFill>
+        <p:spPr>
+          <a:xfrm>
+            <a:off x="0" y="4710300"/>
+            <a:ext cx="9144000" cy="433200"/>
+          </a:xfrm>
+          <a:prstGeom prst="rect">
+            <a:avLst/>
+          </a:prstGeom>
+          <a:noFill/>
+          <a:ln>
+            <a:noFill/>
+          </a:ln>
+        </p:spPr>
+      </p:pic>
+      <p:sp>
+        <p:nvSpPr>
+          <p:cNvPr id="140" name="Google Shape;140;p30"/>
+          <p:cNvSpPr txBox="1"/>
+          <p:nvPr>
+            <p:ph idx="12" type="sldNum"/>
+          </p:nvPr>
+        </p:nvSpPr>
+        <p:spPr>
+          <a:xfrm>
+            <a:off x="8" y="4710292"/>
+            <a:ext cx="548700" cy="393600"/>
+          </a:xfrm>
+          <a:prstGeom prst="rect">
+            <a:avLst/>
+          </a:prstGeom>
+        </p:spPr>
+        <p:txBody>
+          <a:bodyPr anchorCtr="0" anchor="ctr" bIns="91425" lIns="91425" spcFirstLastPara="1" rIns="91425" wrap="square" tIns="91425">
+            <a:normAutofit/>
+          </a:bodyPr>
+          <a:lstStyle/>
+          <a:p>
+            <a:pPr indent="0" lvl="0" marL="0" rtl="0" algn="r">
+              <a:spcBef>
+                <a:spcPts val="0"/>
+              </a:spcBef>
+              <a:spcAft>
+                <a:spcPts val="0"/>
+              </a:spcAft>
+              <a:buNone/>
+            </a:pPr>
+            <a:fld id="{00000000-1234-1234-1234-123412341234}" type="slidenum">
+              <a:rPr lang="en">
+                <a:solidFill>
+                  <a:schemeClr val="lt1"/>
+                </a:solidFill>
+                <a:latin typeface="Arial"/>
+                <a:ea typeface="Arial"/>
+                <a:cs typeface="Arial"/>
+                <a:sym typeface="Arial"/>
+              </a:rPr>
+              <a:t>‹#›</a:t>
+            </a:fld>
+            <a:endParaRPr>
+              <a:solidFill>
+                <a:schemeClr val="lt1"/>
+              </a:solidFill>
+              <a:latin typeface="Arial"/>
+              <a:ea typeface="Arial"/>
+              <a:cs typeface="Arial"/>
+              <a:sym typeface="Arial"/>
+            </a:endParaRPr>
+          </a:p>
+        </p:txBody>
+      </p:sp>
+      <p:sp>
+        <p:nvSpPr>
+          <p:cNvPr id="141" name="Google Shape;141;p30"/>
+          <p:cNvSpPr txBox="1"/>
+          <p:nvPr/>
+        </p:nvSpPr>
+        <p:spPr>
+          <a:xfrm>
+            <a:off x="3234125" y="764400"/>
+            <a:ext cx="5135700" cy="3840300"/>
+          </a:xfrm>
+          <a:prstGeom prst="rect">
+            <a:avLst/>
+          </a:prstGeom>
+          <a:noFill/>
+          <a:ln>
+            <a:noFill/>
+          </a:ln>
+        </p:spPr>
+        <p:txBody>
+          <a:bodyPr anchorCtr="0" anchor="t" bIns="91425" lIns="91425" spcFirstLastPara="1" rIns="91425" wrap="square" tIns="91425">
+            <a:spAutoFit/>
+          </a:bodyPr>
+          <a:lstStyle/>
+          <a:p>
+            <a:pPr indent="-349250" lvl="0" marL="457200" rtl="0" algn="l">
+              <a:lnSpc>
+                <a:spcPct val="115000"/>
+              </a:lnSpc>
+              <a:spcBef>
+                <a:spcPts val="0"/>
+              </a:spcBef>
+              <a:spcAft>
+                <a:spcPts val="0"/>
+              </a:spcAft>
+              <a:buSzPts val="1900"/>
+              <a:buChar char="●"/>
+            </a:pPr>
+            <a:r>
+              <a:rPr b="1" lang="en" sz="1900"/>
+              <a:t>Day 1</a:t>
+            </a:r>
+            <a:r>
+              <a:rPr lang="en" sz="1900"/>
+              <a:t>: Introduction to AI/ML and Python ML ecosystem, </a:t>
+            </a:r>
+            <a:r>
+              <a:rPr lang="en" sz="1900">
+                <a:solidFill>
+                  <a:schemeClr val="dk1"/>
+                </a:solidFill>
+              </a:rPr>
+              <a:t>AI/ML applications in computational biology and chemistry</a:t>
+            </a:r>
+            <a:endParaRPr sz="1900"/>
+          </a:p>
+          <a:p>
+            <a:pPr indent="-349250" lvl="0" marL="457200" rtl="0" algn="l">
+              <a:lnSpc>
+                <a:spcPct val="115000"/>
+              </a:lnSpc>
+              <a:spcBef>
+                <a:spcPts val="0"/>
+              </a:spcBef>
+              <a:spcAft>
+                <a:spcPts val="0"/>
+              </a:spcAft>
+              <a:buSzPts val="1900"/>
+              <a:buChar char="●"/>
+            </a:pPr>
+            <a:r>
+              <a:rPr b="1" lang="en" sz="1900"/>
+              <a:t>Day 2</a:t>
+            </a:r>
+            <a:r>
+              <a:rPr lang="en" sz="1900"/>
+              <a:t>: Data collection and data preparation, </a:t>
+            </a:r>
+            <a:r>
+              <a:rPr lang="en" sz="1900">
+                <a:solidFill>
+                  <a:schemeClr val="dk1"/>
+                </a:solidFill>
+              </a:rPr>
+              <a:t>data readiness for AI/ML checklist</a:t>
+            </a:r>
+            <a:endParaRPr sz="1900"/>
+          </a:p>
+          <a:p>
+            <a:pPr indent="-349250" lvl="0" marL="457200" rtl="0" algn="l">
+              <a:lnSpc>
+                <a:spcPct val="115000"/>
+              </a:lnSpc>
+              <a:spcBef>
+                <a:spcPts val="0"/>
+              </a:spcBef>
+              <a:spcAft>
+                <a:spcPts val="0"/>
+              </a:spcAft>
+              <a:buSzPts val="1900"/>
+              <a:buChar char="●"/>
+            </a:pPr>
+            <a:r>
+              <a:rPr b="1" lang="en" sz="1900"/>
+              <a:t>Day 3</a:t>
+            </a:r>
+            <a:r>
+              <a:rPr lang="en" sz="1900"/>
+              <a:t>: Feature selection, feature engineering and feature scaling</a:t>
+            </a:r>
+            <a:endParaRPr sz="1900"/>
+          </a:p>
+          <a:p>
+            <a:pPr indent="-349250" lvl="0" marL="457200" rtl="0" algn="l">
+              <a:lnSpc>
+                <a:spcPct val="115000"/>
+              </a:lnSpc>
+              <a:spcBef>
+                <a:spcPts val="0"/>
+              </a:spcBef>
+              <a:spcAft>
+                <a:spcPts val="0"/>
+              </a:spcAft>
+              <a:buSzPts val="1900"/>
+              <a:buChar char="●"/>
+            </a:pPr>
+            <a:r>
+              <a:rPr b="1" lang="en" sz="1900"/>
+              <a:t>Day 4</a:t>
+            </a:r>
+            <a:r>
+              <a:rPr lang="en" sz="1900"/>
+              <a:t>: ML model, from its selection to its training, evaluation and tuning</a:t>
+            </a:r>
+            <a:endParaRPr sz="1900"/>
+          </a:p>
+          <a:p>
+            <a:pPr indent="-349250" lvl="0" marL="457200" rtl="0" algn="l">
+              <a:lnSpc>
+                <a:spcPct val="115000"/>
+              </a:lnSpc>
+              <a:spcBef>
+                <a:spcPts val="0"/>
+              </a:spcBef>
+              <a:spcAft>
+                <a:spcPts val="0"/>
+              </a:spcAft>
+              <a:buSzPts val="1900"/>
+              <a:buChar char="●"/>
+            </a:pPr>
+            <a:r>
+              <a:rPr b="1" lang="en" sz="1900"/>
+              <a:t>Day 5</a:t>
+            </a:r>
+            <a:r>
+              <a:rPr lang="en" sz="1900"/>
+              <a:t>: Introduction to deep learning</a:t>
+            </a:r>
+            <a:endParaRPr sz="1900"/>
+          </a:p>
+        </p:txBody>
+      </p:sp>
+      <p:sp>
+        <p:nvSpPr>
+          <p:cNvPr id="142" name="Google Shape;142;p30"/>
+          <p:cNvSpPr txBox="1"/>
+          <p:nvPr/>
+        </p:nvSpPr>
+        <p:spPr>
+          <a:xfrm>
+            <a:off x="3234125" y="0"/>
+            <a:ext cx="5910000" cy="615600"/>
+          </a:xfrm>
+          <a:prstGeom prst="rect">
+            <a:avLst/>
+          </a:prstGeom>
+          <a:noFill/>
+          <a:ln>
+            <a:noFill/>
+          </a:ln>
+        </p:spPr>
+        <p:txBody>
+          <a:bodyPr anchorCtr="0" anchor="t" bIns="91425" lIns="91425" spcFirstLastPara="1" rIns="91425" wrap="square" tIns="91425">
+            <a:spAutoFit/>
+          </a:bodyPr>
+          <a:lstStyle/>
+          <a:p>
+            <a:pPr indent="0" lvl="0" marL="0" rtl="0" algn="l">
+              <a:spcBef>
+                <a:spcPts val="0"/>
+              </a:spcBef>
+              <a:spcAft>
+                <a:spcPts val="0"/>
+              </a:spcAft>
+              <a:buNone/>
+            </a:pPr>
+            <a:r>
+              <a:rPr lang="en" sz="2800">
+                <a:solidFill>
+                  <a:srgbClr val="4A86E8"/>
+                </a:solidFill>
+              </a:rPr>
+              <a:t>Workshop Outcome and agenda</a:t>
+            </a:r>
+            <a:endParaRPr/>
+          </a:p>
+        </p:txBody>
+      </p:sp>
+      <p:pic>
+        <p:nvPicPr>
+          <p:cNvPr id="143" name="Google Shape;143;p30"/>
+          <p:cNvPicPr preferRelativeResize="0"/>
+          <p:nvPr/>
+        </p:nvPicPr>
+        <p:blipFill rotWithShape="1">
+          <a:blip r:embed="rId4">
+            <a:alphaModFix/>
+          </a:blip>
+          <a:srcRect b="7380" l="0" r="0" t="3912"/>
+          <a:stretch/>
+        </p:blipFill>
+        <p:spPr>
+          <a:xfrm>
+            <a:off x="149075" y="0"/>
+            <a:ext cx="2787950" cy="5143500"/>
+          </a:xfrm>
+          <a:prstGeom prst="rect">
+            <a:avLst/>
+          </a:prstGeom>
+          <a:noFill/>
+          <a:ln>
+            <a:noFill/>
+          </a:ln>
+        </p:spPr>
+      </p:pic>
+    </p:spTree>
+  </p:cSld>
+  <p:clrMapOvr>
+    <a:masterClrMapping/>
+  </p:clrMapOvr>
+</p:sld>
+</file>
+
+<file path=ppt/slides/slide7.xml><?xml version="1.0" encoding="utf-8"?>
+<p:sld xmlns:a="http://schemas.openxmlformats.org/drawingml/2006/main" xmlns:r="http://schemas.openxmlformats.org/officeDocument/2006/relationships" xmlns:mc="http://schemas.openxmlformats.org/markup-compatibility/2006" xmlns:mv="urn:schemas-microsoft-com:mac:vml" xmlns:p="http://schemas.openxmlformats.org/presentationml/2006/main" xmlns:c="http://schemas.openxmlformats.org/drawingml/2006/chart" xmlns:dgm="http://schemas.openxmlformats.org/drawingml/2006/diagram" xmlns:o="urn:schemas-microsoft-com:office:office" xmlns:v="urn:schemas-microsoft-com:vml" xmlns:pvml="urn:schemas-microsoft-com:office:powerpoint" xmlns:com="http://schemas.openxmlformats.org/drawingml/2006/compatibility" xmlns:p14="http://schemas.microsoft.com/office/powerpoint/2010/main" xmlns:p15="http://schemas.microsoft.com/office/powerpoint/2012/main" xmlns:ahyp="http://schemas.microsoft.com/office/drawing/2018/hyperlinkcolor">
+  <p:cSld>
+    <p:spTree>
+      <p:nvGrpSpPr>
+        <p:cNvPr id="147" name="Shape 147"/>
+        <p:cNvGrpSpPr/>
+        <p:nvPr/>
+      </p:nvGrpSpPr>
+      <p:grpSpPr>
+        <a:xfrm>
+          <a:off x="0" y="0"/>
+          <a:ext cx="0" cy="0"/>
+          <a:chOff x="0" y="0"/>
+          <a:chExt cx="0" cy="0"/>
+        </a:xfrm>
+      </p:grpSpPr>
+      <p:pic>
+        <p:nvPicPr>
+          <p:cNvPr id="148" name="Google Shape;148;p31"/>
+          <p:cNvPicPr preferRelativeResize="0"/>
+          <p:nvPr/>
+        </p:nvPicPr>
+        <p:blipFill>
+          <a:blip r:embed="rId3">
+            <a:alphaModFix/>
+          </a:blip>
+          <a:stretch>
+            <a:fillRect/>
+          </a:stretch>
+        </p:blipFill>
+        <p:spPr>
+          <a:xfrm>
+            <a:off x="0" y="4710300"/>
+            <a:ext cx="9144000" cy="433200"/>
+          </a:xfrm>
+          <a:prstGeom prst="rect">
+            <a:avLst/>
+          </a:prstGeom>
+          <a:noFill/>
+          <a:ln>
+            <a:noFill/>
+          </a:ln>
+        </p:spPr>
+      </p:pic>
+      <p:sp>
+        <p:nvSpPr>
+          <p:cNvPr id="149" name="Google Shape;149;p31"/>
+          <p:cNvSpPr txBox="1"/>
+          <p:nvPr>
             <p:ph type="title"/>
           </p:nvPr>
         </p:nvSpPr>
@@ -12452,7 +13386,7 @@
       </p:sp>
       <p:sp>
         <p:nvSpPr>
-          <p:cNvPr id="134" name="Google Shape;134;p29"/>
+          <p:cNvPr id="150" name="Google Shape;150;p31"/>
           <p:cNvSpPr txBox="1"/>
           <p:nvPr/>
         </p:nvSpPr>
@@ -12615,7 +13549,7 @@
       </p:sp>
       <p:sp>
         <p:nvSpPr>
-          <p:cNvPr id="135" name="Google Shape;135;p29"/>
+          <p:cNvPr id="151" name="Google Shape;151;p31"/>
           <p:cNvSpPr txBox="1"/>
           <p:nvPr>
             <p:ph idx="12" type="sldNum"/>
@@ -12677,12 +13611,12 @@
 </p:sld>
 </file>
 
-<file path=ppt/slides/slide6.xml><?xml version="1.0" encoding="utf-8"?>
+<file path=ppt/slides/slide8.xml><?xml version="1.0" encoding="utf-8"?>
 <p:sld xmlns:a="http://schemas.openxmlformats.org/drawingml/2006/main" xmlns:r="http://schemas.openxmlformats.org/officeDocument/2006/relationships" xmlns:mc="http://schemas.openxmlformats.org/markup-compatibility/2006" xmlns:mv="urn:schemas-microsoft-com:mac:vml" xmlns:p="http://schemas.openxmlformats.org/presentationml/2006/main" xmlns:c="http://schemas.openxmlformats.org/drawingml/2006/chart" xmlns:dgm="http://schemas.openxmlformats.org/drawingml/2006/diagram" xmlns:o="urn:schemas-microsoft-com:office:office" xmlns:v="urn:schemas-microsoft-com:vml" xmlns:pvml="urn:schemas-microsoft-com:office:powerpoint" xmlns:com="http://schemas.openxmlformats.org/drawingml/2006/compatibility" xmlns:p14="http://schemas.microsoft.com/office/powerpoint/2010/main" xmlns:p15="http://schemas.microsoft.com/office/powerpoint/2012/main" xmlns:ahyp="http://schemas.microsoft.com/office/drawing/2018/hyperlinkcolor">
   <p:cSld>
     <p:spTree>
       <p:nvGrpSpPr>
-        <p:cNvPr id="139" name="Shape 139"/>
+        <p:cNvPr id="155" name="Shape 155"/>
         <p:cNvGrpSpPr/>
         <p:nvPr/>
       </p:nvGrpSpPr>
@@ -12696,7 +13630,7 @@
       </p:grpSpPr>
       <p:pic>
         <p:nvPicPr>
-          <p:cNvPr id="140" name="Google Shape;140;p30"/>
+          <p:cNvPr id="156" name="Google Shape;156;p32"/>
           <p:cNvPicPr preferRelativeResize="0"/>
           <p:nvPr/>
         </p:nvPicPr>
@@ -12724,7 +13658,7 @@
       </p:pic>
       <p:sp>
         <p:nvSpPr>
-          <p:cNvPr id="141" name="Google Shape;141;p30"/>
+          <p:cNvPr id="157" name="Google Shape;157;p32"/>
           <p:cNvSpPr txBox="1"/>
           <p:nvPr>
             <p:ph type="title"/>
@@ -12760,6 +13694,339 @@
                   <a:srgbClr val="4A86E8"/>
                 </a:solidFill>
               </a:rPr>
+              <a:t>General Information</a:t>
+            </a:r>
+            <a:endParaRPr>
+              <a:solidFill>
+                <a:srgbClr val="4A86E8"/>
+              </a:solidFill>
+            </a:endParaRPr>
+          </a:p>
+        </p:txBody>
+      </p:sp>
+      <p:sp>
+        <p:nvSpPr>
+          <p:cNvPr id="158" name="Google Shape;158;p32"/>
+          <p:cNvSpPr txBox="1"/>
+          <p:nvPr/>
+        </p:nvSpPr>
+        <p:spPr>
+          <a:xfrm>
+            <a:off x="311700" y="717650"/>
+            <a:ext cx="8665500" cy="3836400"/>
+          </a:xfrm>
+          <a:prstGeom prst="rect">
+            <a:avLst/>
+          </a:prstGeom>
+          <a:noFill/>
+          <a:ln>
+            <a:noFill/>
+          </a:ln>
+        </p:spPr>
+        <p:txBody>
+          <a:bodyPr anchorCtr="0" anchor="t" bIns="91425" lIns="91425" spcFirstLastPara="1" rIns="91425" wrap="square" tIns="91425">
+            <a:spAutoFit/>
+          </a:bodyPr>
+          <a:lstStyle/>
+          <a:p>
+            <a:pPr indent="0" lvl="0" marL="0" rtl="0" algn="l">
+              <a:lnSpc>
+                <a:spcPct val="115000"/>
+              </a:lnSpc>
+              <a:spcBef>
+                <a:spcPts val="0"/>
+              </a:spcBef>
+              <a:spcAft>
+                <a:spcPts val="0"/>
+              </a:spcAft>
+              <a:buNone/>
+            </a:pPr>
+            <a:r>
+              <a:rPr b="1" lang="en" sz="1300"/>
+              <a:t>Parking/Transportation:</a:t>
+            </a:r>
+            <a:endParaRPr b="1" sz="1300"/>
+          </a:p>
+          <a:p>
+            <a:pPr indent="0" lvl="0" marL="0" rtl="0" algn="l">
+              <a:lnSpc>
+                <a:spcPct val="115000"/>
+              </a:lnSpc>
+              <a:spcBef>
+                <a:spcPts val="0"/>
+              </a:spcBef>
+              <a:spcAft>
+                <a:spcPts val="0"/>
+              </a:spcAft>
+              <a:buNone/>
+            </a:pPr>
+            <a:r>
+              <a:rPr lang="en" sz="1300"/>
+              <a:t>UD permit parking is available. Gray Permit: Lot 207 (some spaces) and on street parking on Discovery Blvd and Avenue 1743; Red Permit: Lot 209.  Those without UD parking permits may use on street parking and pay at kiosks or using the PassPort app.  Parking map available at: https://sites.udel.edu/parking/.  UD Bus: North/South College Route use the Star Tower stop.</a:t>
+            </a:r>
+            <a:endParaRPr sz="1300"/>
+          </a:p>
+          <a:p>
+            <a:pPr indent="0" lvl="0" marL="0" rtl="0" algn="l">
+              <a:lnSpc>
+                <a:spcPct val="115000"/>
+              </a:lnSpc>
+              <a:spcBef>
+                <a:spcPts val="0"/>
+              </a:spcBef>
+              <a:spcAft>
+                <a:spcPts val="0"/>
+              </a:spcAft>
+              <a:buNone/>
+            </a:pPr>
+            <a:r>
+              <a:t/>
+            </a:r>
+            <a:endParaRPr sz="1300"/>
+          </a:p>
+          <a:p>
+            <a:pPr indent="0" lvl="0" marL="0" rtl="0" algn="l">
+              <a:lnSpc>
+                <a:spcPct val="115000"/>
+              </a:lnSpc>
+              <a:spcBef>
+                <a:spcPts val="0"/>
+              </a:spcBef>
+              <a:spcAft>
+                <a:spcPts val="0"/>
+              </a:spcAft>
+              <a:buNone/>
+            </a:pPr>
+            <a:r>
+              <a:rPr b="1" lang="en" sz="1300"/>
+              <a:t>COVID Considerations:</a:t>
+            </a:r>
+            <a:endParaRPr b="1" sz="1300"/>
+          </a:p>
+          <a:p>
+            <a:pPr indent="0" lvl="0" marL="0" rtl="0" algn="l">
+              <a:lnSpc>
+                <a:spcPct val="115000"/>
+              </a:lnSpc>
+              <a:spcBef>
+                <a:spcPts val="0"/>
+              </a:spcBef>
+              <a:spcAft>
+                <a:spcPts val="0"/>
+              </a:spcAft>
+              <a:buNone/>
+            </a:pPr>
+            <a:r>
+              <a:rPr lang="en" sz="1300"/>
+              <a:t>All participants must complete the UD COVID Check (https://covidcheck.udel.edu) each day before arriving on UD’s campus.  While the University of Delaware no longer requires masks to be worn for non-classroom events, all participants are encouraged to bring a mask for use whenever social distancing cannot be maintained.  </a:t>
+            </a:r>
+            <a:endParaRPr sz="1300"/>
+          </a:p>
+          <a:p>
+            <a:pPr indent="0" lvl="0" marL="0" rtl="0" algn="l">
+              <a:lnSpc>
+                <a:spcPct val="115000"/>
+              </a:lnSpc>
+              <a:spcBef>
+                <a:spcPts val="0"/>
+              </a:spcBef>
+              <a:spcAft>
+                <a:spcPts val="0"/>
+              </a:spcAft>
+              <a:buNone/>
+            </a:pPr>
+            <a:r>
+              <a:t/>
+            </a:r>
+            <a:endParaRPr sz="1300"/>
+          </a:p>
+          <a:p>
+            <a:pPr indent="0" lvl="0" marL="0" rtl="0" algn="l">
+              <a:lnSpc>
+                <a:spcPct val="115000"/>
+              </a:lnSpc>
+              <a:spcBef>
+                <a:spcPts val="0"/>
+              </a:spcBef>
+              <a:spcAft>
+                <a:spcPts val="0"/>
+              </a:spcAft>
+              <a:buNone/>
+            </a:pPr>
+            <a:r>
+              <a:rPr b="1" lang="en" sz="1300"/>
+              <a:t>Please Be Kind:</a:t>
+            </a:r>
+            <a:endParaRPr b="1" sz="1300"/>
+          </a:p>
+          <a:p>
+            <a:pPr indent="0" lvl="0" marL="0" rtl="0" algn="l">
+              <a:lnSpc>
+                <a:spcPct val="115000"/>
+              </a:lnSpc>
+              <a:spcBef>
+                <a:spcPts val="0"/>
+              </a:spcBef>
+              <a:spcAft>
+                <a:spcPts val="0"/>
+              </a:spcAft>
+              <a:buNone/>
+            </a:pPr>
+            <a:r>
+              <a:rPr lang="en" sz="1300"/>
+              <a:t>The organizers of the workshop and the University of Delaware are dedicated to fostering a safe and inclusive learning environment that does not discriminate against any person on the basis of race, color, national origin, sex, gender identity or expression, sexual orientation, disability, religion, age, or any other characteristic.  All participants are asked to also please abide by these values in your interactions with others throughout this workshop.</a:t>
+            </a:r>
+            <a:endParaRPr sz="1300"/>
+          </a:p>
+        </p:txBody>
+      </p:sp>
+      <p:sp>
+        <p:nvSpPr>
+          <p:cNvPr id="159" name="Google Shape;159;p32"/>
+          <p:cNvSpPr txBox="1"/>
+          <p:nvPr>
+            <p:ph idx="12" type="sldNum"/>
+          </p:nvPr>
+        </p:nvSpPr>
+        <p:spPr>
+          <a:xfrm>
+            <a:off x="8" y="4730092"/>
+            <a:ext cx="548700" cy="393600"/>
+          </a:xfrm>
+          <a:prstGeom prst="rect">
+            <a:avLst/>
+          </a:prstGeom>
+        </p:spPr>
+        <p:txBody>
+          <a:bodyPr anchorCtr="0" anchor="ctr" bIns="91425" lIns="91425" spcFirstLastPara="1" rIns="91425" wrap="square" tIns="91425">
+            <a:normAutofit/>
+          </a:bodyPr>
+          <a:lstStyle/>
+          <a:p>
+            <a:pPr indent="0" lvl="0" marL="0" rtl="0" algn="r">
+              <a:spcBef>
+                <a:spcPts val="0"/>
+              </a:spcBef>
+              <a:spcAft>
+                <a:spcPts val="0"/>
+              </a:spcAft>
+              <a:buNone/>
+            </a:pPr>
+            <a:fld id="{00000000-1234-1234-1234-123412341234}" type="slidenum">
+              <a:rPr lang="en">
+                <a:solidFill>
+                  <a:schemeClr val="lt1"/>
+                </a:solidFill>
+                <a:latin typeface="Arial"/>
+                <a:ea typeface="Arial"/>
+                <a:cs typeface="Arial"/>
+                <a:sym typeface="Arial"/>
+              </a:rPr>
+              <a:t>‹#›</a:t>
+            </a:fld>
+            <a:endParaRPr>
+              <a:solidFill>
+                <a:schemeClr val="lt1"/>
+              </a:solidFill>
+              <a:latin typeface="Arial"/>
+              <a:ea typeface="Arial"/>
+              <a:cs typeface="Arial"/>
+              <a:sym typeface="Arial"/>
+            </a:endParaRPr>
+          </a:p>
+        </p:txBody>
+      </p:sp>
+    </p:spTree>
+  </p:cSld>
+  <p:clrMapOvr>
+    <a:masterClrMapping/>
+  </p:clrMapOvr>
+</p:sld>
+</file>
+
+<file path=ppt/slides/slide9.xml><?xml version="1.0" encoding="utf-8"?>
+<p:sld xmlns:a="http://schemas.openxmlformats.org/drawingml/2006/main" xmlns:r="http://schemas.openxmlformats.org/officeDocument/2006/relationships" xmlns:mc="http://schemas.openxmlformats.org/markup-compatibility/2006" xmlns:mv="urn:schemas-microsoft-com:mac:vml" xmlns:p="http://schemas.openxmlformats.org/presentationml/2006/main" xmlns:c="http://schemas.openxmlformats.org/drawingml/2006/chart" xmlns:dgm="http://schemas.openxmlformats.org/drawingml/2006/diagram" xmlns:o="urn:schemas-microsoft-com:office:office" xmlns:v="urn:schemas-microsoft-com:vml" xmlns:pvml="urn:schemas-microsoft-com:office:powerpoint" xmlns:com="http://schemas.openxmlformats.org/drawingml/2006/compatibility" xmlns:p14="http://schemas.microsoft.com/office/powerpoint/2010/main" xmlns:p15="http://schemas.microsoft.com/office/powerpoint/2012/main" xmlns:ahyp="http://schemas.microsoft.com/office/drawing/2018/hyperlinkcolor">
+  <p:cSld>
+    <p:spTree>
+      <p:nvGrpSpPr>
+        <p:cNvPr id="163" name="Shape 163"/>
+        <p:cNvGrpSpPr/>
+        <p:nvPr/>
+      </p:nvGrpSpPr>
+      <p:grpSpPr>
+        <a:xfrm>
+          <a:off x="0" y="0"/>
+          <a:ext cx="0" cy="0"/>
+          <a:chOff x="0" y="0"/>
+          <a:chExt cx="0" cy="0"/>
+        </a:xfrm>
+      </p:grpSpPr>
+      <p:pic>
+        <p:nvPicPr>
+          <p:cNvPr id="164" name="Google Shape;164;p33"/>
+          <p:cNvPicPr preferRelativeResize="0"/>
+          <p:nvPr/>
+        </p:nvPicPr>
+        <p:blipFill>
+          <a:blip r:embed="rId3">
+            <a:alphaModFix/>
+          </a:blip>
+          <a:stretch>
+            <a:fillRect/>
+          </a:stretch>
+        </p:blipFill>
+        <p:spPr>
+          <a:xfrm>
+            <a:off x="0" y="4710300"/>
+            <a:ext cx="9144000" cy="433200"/>
+          </a:xfrm>
+          <a:prstGeom prst="rect">
+            <a:avLst/>
+          </a:prstGeom>
+          <a:noFill/>
+          <a:ln>
+            <a:noFill/>
+          </a:ln>
+        </p:spPr>
+      </p:pic>
+      <p:sp>
+        <p:nvSpPr>
+          <p:cNvPr id="165" name="Google Shape;165;p33"/>
+          <p:cNvSpPr txBox="1"/>
+          <p:nvPr>
+            <p:ph type="title"/>
+          </p:nvPr>
+        </p:nvSpPr>
+        <p:spPr>
+          <a:xfrm>
+            <a:off x="311700" y="109850"/>
+            <a:ext cx="8520600" cy="607800"/>
+          </a:xfrm>
+          <a:prstGeom prst="rect">
+            <a:avLst/>
+          </a:prstGeom>
+        </p:spPr>
+        <p:txBody>
+          <a:bodyPr anchorCtr="0" anchor="t" bIns="91425" lIns="91425" spcFirstLastPara="1" rIns="91425" wrap="square" tIns="91425">
+            <a:normAutofit fontScale="90000"/>
+          </a:bodyPr>
+          <a:lstStyle/>
+          <a:p>
+            <a:pPr indent="0" lvl="0" marL="0" rtl="0" algn="l">
+              <a:spcBef>
+                <a:spcPts val="0"/>
+              </a:spcBef>
+              <a:spcAft>
+                <a:spcPts val="0"/>
+              </a:spcAft>
+              <a:buNone/>
+            </a:pPr>
+            <a:r>
+              <a:rPr lang="en">
+                <a:solidFill>
+                  <a:srgbClr val="4A86E8"/>
+                </a:solidFill>
+              </a:rPr>
               <a:t>Acknowledgement</a:t>
             </a:r>
             <a:endParaRPr>
@@ -12772,7 +14039,7 @@
       </p:sp>
       <p:sp>
         <p:nvSpPr>
-          <p:cNvPr id="142" name="Google Shape;142;p30"/>
+          <p:cNvPr id="166" name="Google Shape;166;p33"/>
           <p:cNvSpPr txBox="1"/>
           <p:nvPr/>
         </p:nvSpPr>
@@ -12918,7 +14185,7 @@
       </p:sp>
       <p:sp>
         <p:nvSpPr>
-          <p:cNvPr id="143" name="Google Shape;143;p30"/>
+          <p:cNvPr id="167" name="Google Shape;167;p33"/>
           <p:cNvSpPr txBox="1"/>
           <p:nvPr>
             <p:ph idx="12" type="sldNum"/>

</xml_diff>

<commit_message>
updated Day 1 lecture slides
</commit_message>
<xml_diff>
--- a/Day_1/Lectures/Day_1_Introduction_to_Workshop.pptx
+++ b/Day_1/Lectures/Day_1_Introduction_to_Workshop.pptx
@@ -2,22 +2,22 @@
 <file path=ppt/presentation.xml><?xml version="1.0" encoding="utf-8"?>
 <p:presentation xmlns:a="http://schemas.openxmlformats.org/drawingml/2006/main" xmlns:r="http://schemas.openxmlformats.org/officeDocument/2006/relationships" xmlns:mc="http://schemas.openxmlformats.org/markup-compatibility/2006" xmlns:mv="urn:schemas-microsoft-com:mac:vml" xmlns:p="http://schemas.openxmlformats.org/presentationml/2006/main" xmlns:c="http://schemas.openxmlformats.org/drawingml/2006/chart" xmlns:dgm="http://schemas.openxmlformats.org/drawingml/2006/diagram" xmlns:o="urn:schemas-microsoft-com:office:office" xmlns:v="urn:schemas-microsoft-com:vml" xmlns:pvml="urn:schemas-microsoft-com:office:powerpoint" xmlns:com="http://schemas.openxmlformats.org/drawingml/2006/compatibility" xmlns:p14="http://schemas.microsoft.com/office/powerpoint/2010/main" xmlns:p15="http://schemas.microsoft.com/office/powerpoint/2012/main" xmlns:ahyp="http://schemas.microsoft.com/office/drawing/2018/hyperlinkcolor" autoCompressPictures="0" strictFirstAndLastChars="0" saveSubsetFonts="1">
   <p:sldMasterIdLst>
-    <p:sldMasterId id="2147483670" r:id="rId4"/>
-    <p:sldMasterId id="2147483671" r:id="rId5"/>
+    <p:sldMasterId id="2147483670" r:id="rId5"/>
+    <p:sldMasterId id="2147483671" r:id="rId6"/>
   </p:sldMasterIdLst>
   <p:notesMasterIdLst>
-    <p:notesMasterId r:id="rId6"/>
+    <p:notesMasterId r:id="rId7"/>
   </p:notesMasterIdLst>
   <p:sldIdLst>
-    <p:sldId id="256" r:id="rId7"/>
-    <p:sldId id="257" r:id="rId8"/>
-    <p:sldId id="258" r:id="rId9"/>
-    <p:sldId id="259" r:id="rId10"/>
-    <p:sldId id="260" r:id="rId11"/>
-    <p:sldId id="261" r:id="rId12"/>
-    <p:sldId id="262" r:id="rId13"/>
-    <p:sldId id="263" r:id="rId14"/>
-    <p:sldId id="264" r:id="rId15"/>
+    <p:sldId id="256" r:id="rId8"/>
+    <p:sldId id="257" r:id="rId9"/>
+    <p:sldId id="258" r:id="rId10"/>
+    <p:sldId id="259" r:id="rId11"/>
+    <p:sldId id="260" r:id="rId12"/>
+    <p:sldId id="261" r:id="rId13"/>
+    <p:sldId id="262" r:id="rId14"/>
+    <p:sldId id="263" r:id="rId15"/>
+    <p:sldId id="264" r:id="rId16"/>
   </p:sldIdLst>
   <p:sldSz cy="5143500" cx="9144000"/>
   <p:notesSz cx="6858000" cy="9144000"/>
@@ -267,6 +267,26 @@
     </p:ext>
   </p:extLst>
 </p:presentation>
+</file>
+
+<file path=ppt/commentAuthors.xml><?xml version="1.0" encoding="utf-8"?>
+<p:cmAuthorLst xmlns:a="http://schemas.openxmlformats.org/drawingml/2006/main" xmlns:r="http://schemas.openxmlformats.org/officeDocument/2006/relationships" xmlns:mc="http://schemas.openxmlformats.org/markup-compatibility/2006" xmlns:mv="urn:schemas-microsoft-com:mac:vml" xmlns:p="http://schemas.openxmlformats.org/presentationml/2006/main" xmlns:c="http://schemas.openxmlformats.org/drawingml/2006/chart" xmlns:dgm="http://schemas.openxmlformats.org/drawingml/2006/diagram" xmlns:o="urn:schemas-microsoft-com:office:office" xmlns:v="urn:schemas-microsoft-com:vml" xmlns:pvml="urn:schemas-microsoft-com:office:powerpoint" xmlns:com="http://schemas.openxmlformats.org/drawingml/2006/compatibility" xmlns:p14="http://schemas.microsoft.com/office/powerpoint/2010/main" xmlns:p15="http://schemas.microsoft.com/office/powerpoint/2012/main" xmlns:ahyp="http://schemas.microsoft.com/office/drawing/2018/hyperlinkcolor">
+  <p:cmAuthor clrIdx="0" id="0" initials="" lastIdx="1" name="Cecilia Arighi"/>
+  <p:cmAuthor clrIdx="1" id="1" initials="" lastIdx="1" name="Chuming Chen"/>
+</p:cmAuthorLst>
+</file>
+
+<file path=ppt/comments/comment1.xml><?xml version="1.0" encoding="utf-8"?>
+<p:cmLst xmlns:a="http://schemas.openxmlformats.org/drawingml/2006/main" xmlns:r="http://schemas.openxmlformats.org/officeDocument/2006/relationships" xmlns:mc="http://schemas.openxmlformats.org/markup-compatibility/2006" xmlns:mv="urn:schemas-microsoft-com:mac:vml" xmlns:p="http://schemas.openxmlformats.org/presentationml/2006/main" xmlns:c="http://schemas.openxmlformats.org/drawingml/2006/chart" xmlns:dgm="http://schemas.openxmlformats.org/drawingml/2006/diagram" xmlns:o="urn:schemas-microsoft-com:office:office" xmlns:v="urn:schemas-microsoft-com:vml" xmlns:pvml="urn:schemas-microsoft-com:office:powerpoint" xmlns:com="http://schemas.openxmlformats.org/drawingml/2006/compatibility" xmlns:p14="http://schemas.microsoft.com/office/powerpoint/2010/main" xmlns:p15="http://schemas.microsoft.com/office/powerpoint/2012/main" xmlns:ahyp="http://schemas.microsoft.com/office/drawing/2018/hyperlinkcolor">
+  <p:cm authorId="0" idx="1" dt="2022-05-19T13:11:59.548">
+    <p:pos x="6000" y="0"/>
+    <p:text>any funding to add? this would be the place</p:text>
+  </p:cm>
+  <p:cm authorId="1" idx="1" dt="2022-05-19T13:11:59.548">
+    <p:pos x="6000" y="0"/>
+    <p:text>Done</p:text>
+  </p:cm>
+</p:cmLst>
 </file>
 
 <file path=ppt/notesMasters/notesMaster1.xml><?xml version="1.0" encoding="utf-8"?>
@@ -13266,13 +13286,13 @@
           <a:blip r:embed="rId4">
             <a:alphaModFix/>
           </a:blip>
-          <a:srcRect b="7380" l="0" r="0" t="3912"/>
+          <a:srcRect b="6412" l="0" r="0" t="4277"/>
           <a:stretch/>
         </p:blipFill>
         <p:spPr>
           <a:xfrm>
-            <a:off x="149075" y="0"/>
-            <a:ext cx="2787950" cy="5143500"/>
+            <a:off x="548700" y="0"/>
+            <a:ext cx="2303678" cy="5143500"/>
           </a:xfrm>
           <a:prstGeom prst="rect">
             <a:avLst/>
@@ -13392,7 +13412,7 @@
         </p:nvSpPr>
         <p:spPr>
           <a:xfrm>
-            <a:off x="890875" y="717650"/>
+            <a:off x="1104600" y="1107150"/>
             <a:ext cx="7727700" cy="3110100"/>
           </a:xfrm>
           <a:prstGeom prst="rect">
@@ -13968,7 +13988,7 @@
           <p:nvPr/>
         </p:nvPicPr>
         <p:blipFill>
-          <a:blip r:embed="rId3">
+          <a:blip r:embed="rId4">
             <a:alphaModFix/>
           </a:blip>
           <a:stretch>
@@ -14027,7 +14047,7 @@
                   <a:srgbClr val="4A86E8"/>
                 </a:solidFill>
               </a:rPr>
-              <a:t>Acknowledgement</a:t>
+              <a:t>Acknowledgements</a:t>
             </a:r>
             <a:endParaRPr>
               <a:solidFill>
@@ -14045,8 +14065,8 @@
         </p:nvSpPr>
         <p:spPr>
           <a:xfrm>
-            <a:off x="890875" y="717650"/>
-            <a:ext cx="7727700" cy="2366700"/>
+            <a:off x="548700" y="717650"/>
+            <a:ext cx="3595500" cy="2366700"/>
           </a:xfrm>
           <a:prstGeom prst="rect">
             <a:avLst/>
@@ -14239,6 +14259,55 @@
           </a:p>
         </p:txBody>
       </p:sp>
+      <p:sp>
+        <p:nvSpPr>
+          <p:cNvPr id="168" name="Google Shape;168;p33"/>
+          <p:cNvSpPr txBox="1"/>
+          <p:nvPr/>
+        </p:nvSpPr>
+        <p:spPr>
+          <a:xfrm>
+            <a:off x="611000" y="3328925"/>
+            <a:ext cx="7353000" cy="738900"/>
+          </a:xfrm>
+          <a:prstGeom prst="rect">
+            <a:avLst/>
+          </a:prstGeom>
+          <a:noFill/>
+          <a:ln>
+            <a:noFill/>
+          </a:ln>
+        </p:spPr>
+        <p:txBody>
+          <a:bodyPr anchorCtr="0" anchor="t" bIns="91425" lIns="91425" spcFirstLastPara="1" rIns="91425" wrap="square" tIns="91425">
+            <a:spAutoFit/>
+          </a:bodyPr>
+          <a:lstStyle/>
+          <a:p>
+            <a:pPr indent="0" lvl="0" marL="0" rtl="0" algn="l">
+              <a:spcBef>
+                <a:spcPts val="0"/>
+              </a:spcBef>
+              <a:spcAft>
+                <a:spcPts val="0"/>
+              </a:spcAft>
+              <a:buNone/>
+            </a:pPr>
+            <a:r>
+              <a:rPr lang="en" sz="1800">
+                <a:solidFill>
+                  <a:srgbClr val="24292F"/>
+                </a:solidFill>
+                <a:highlight>
+                  <a:srgbClr val="FFFFFF"/>
+                </a:highlight>
+              </a:rPr>
+              <a:t>This workshop is offered free of charge with support from the NIH National Institute for General Medical Sciences (T32GM133395-03S1).</a:t>
+            </a:r>
+            <a:endParaRPr sz="2000"/>
+          </a:p>
+        </p:txBody>
+      </p:sp>
     </p:spTree>
   </p:cSld>
   <p:clrMapOvr>
@@ -14248,9 +14317,9 @@
 </file>
 
 <file path=ppt/theme/theme1.xml><?xml version="1.0" encoding="utf-8"?>
-<a:theme xmlns:a="http://schemas.openxmlformats.org/drawingml/2006/main" xmlns:r="http://schemas.openxmlformats.org/officeDocument/2006/relationships">
+<a:theme xmlns:a="http://schemas.openxmlformats.org/drawingml/2006/main" xmlns:r="http://schemas.openxmlformats.org/officeDocument/2006/relationships" name="Simple Light">
   <a:themeElements>
-    <a:clrScheme name="Default">
+    <a:clrScheme name="Simple Light">
       <a:dk1>
         <a:srgbClr val="000000"/>
       </a:dk1>
@@ -14258,34 +14327,34 @@
         <a:srgbClr val="FFFFFF"/>
       </a:lt1>
       <a:dk2>
-        <a:srgbClr val="158158"/>
+        <a:srgbClr val="595959"/>
       </a:dk2>
       <a:lt2>
-        <a:srgbClr val="F3F3F3"/>
+        <a:srgbClr val="EEEEEE"/>
       </a:lt2>
       <a:accent1>
-        <a:srgbClr val="058DC7"/>
+        <a:srgbClr val="4285F4"/>
       </a:accent1>
       <a:accent2>
-        <a:srgbClr val="50B432"/>
+        <a:srgbClr val="212121"/>
       </a:accent2>
       <a:accent3>
-        <a:srgbClr val="ED561B"/>
+        <a:srgbClr val="78909C"/>
       </a:accent3>
       <a:accent4>
-        <a:srgbClr val="EDEF00"/>
+        <a:srgbClr val="FFAB40"/>
       </a:accent4>
       <a:accent5>
-        <a:srgbClr val="24CBE5"/>
+        <a:srgbClr val="0097A7"/>
       </a:accent5>
       <a:accent6>
-        <a:srgbClr val="64E572"/>
+        <a:srgbClr val="EEFF41"/>
       </a:accent6>
       <a:hlink>
-        <a:srgbClr val="2200CC"/>
+        <a:srgbClr val="0097A7"/>
       </a:hlink>
       <a:folHlink>
-        <a:srgbClr val="551A8B"/>
+        <a:srgbClr val="0097A7"/>
       </a:folHlink>
     </a:clrScheme>
     <a:fontScheme name="Office">
@@ -14527,9 +14596,9 @@
 </file>
 
 <file path=ppt/theme/theme2.xml><?xml version="1.0" encoding="utf-8"?>
-<a:theme xmlns:a="http://schemas.openxmlformats.org/drawingml/2006/main" xmlns:r="http://schemas.openxmlformats.org/officeDocument/2006/relationships" name="Simple Light">
+<a:theme xmlns:a="http://schemas.openxmlformats.org/drawingml/2006/main" xmlns:r="http://schemas.openxmlformats.org/officeDocument/2006/relationships">
   <a:themeElements>
-    <a:clrScheme name="Simple Light">
+    <a:clrScheme name="Default">
       <a:dk1>
         <a:srgbClr val="000000"/>
       </a:dk1>
@@ -14537,34 +14606,34 @@
         <a:srgbClr val="FFFFFF"/>
       </a:lt1>
       <a:dk2>
-        <a:srgbClr val="595959"/>
+        <a:srgbClr val="158158"/>
       </a:dk2>
       <a:lt2>
-        <a:srgbClr val="EEEEEE"/>
+        <a:srgbClr val="F3F3F3"/>
       </a:lt2>
       <a:accent1>
-        <a:srgbClr val="4285F4"/>
+        <a:srgbClr val="058DC7"/>
       </a:accent1>
       <a:accent2>
-        <a:srgbClr val="212121"/>
+        <a:srgbClr val="50B432"/>
       </a:accent2>
       <a:accent3>
-        <a:srgbClr val="78909C"/>
+        <a:srgbClr val="ED561B"/>
       </a:accent3>
       <a:accent4>
-        <a:srgbClr val="FFAB40"/>
+        <a:srgbClr val="EDEF00"/>
       </a:accent4>
       <a:accent5>
-        <a:srgbClr val="0097A7"/>
+        <a:srgbClr val="24CBE5"/>
       </a:accent5>
       <a:accent6>
-        <a:srgbClr val="EEFF41"/>
+        <a:srgbClr val="64E572"/>
       </a:accent6>
       <a:hlink>
-        <a:srgbClr val="0097A7"/>
+        <a:srgbClr val="2200CC"/>
       </a:hlink>
       <a:folHlink>
-        <a:srgbClr val="0097A7"/>
+        <a:srgbClr val="551A8B"/>
       </a:folHlink>
     </a:clrScheme>
     <a:fontScheme name="Office">

</xml_diff>

<commit_message>
Updated Day 1 contents
</commit_message>
<xml_diff>
--- a/Day_1/Lectures/Day_1_Introduction_to_Workshop.pptx
+++ b/Day_1/Lectures/Day_1_Introduction_to_Workshop.pptx
@@ -2,22 +2,22 @@
 <file path=ppt/presentation.xml><?xml version="1.0" encoding="utf-8"?>
 <p:presentation xmlns:a="http://schemas.openxmlformats.org/drawingml/2006/main" xmlns:r="http://schemas.openxmlformats.org/officeDocument/2006/relationships" xmlns:mc="http://schemas.openxmlformats.org/markup-compatibility/2006" xmlns:mv="urn:schemas-microsoft-com:mac:vml" xmlns:p="http://schemas.openxmlformats.org/presentationml/2006/main" xmlns:c="http://schemas.openxmlformats.org/drawingml/2006/chart" xmlns:dgm="http://schemas.openxmlformats.org/drawingml/2006/diagram" xmlns:o="urn:schemas-microsoft-com:office:office" xmlns:v="urn:schemas-microsoft-com:vml" xmlns:pvml="urn:schemas-microsoft-com:office:powerpoint" xmlns:com="http://schemas.openxmlformats.org/drawingml/2006/compatibility" xmlns:p14="http://schemas.microsoft.com/office/powerpoint/2010/main" xmlns:p15="http://schemas.microsoft.com/office/powerpoint/2012/main" xmlns:ahyp="http://schemas.microsoft.com/office/drawing/2018/hyperlinkcolor" autoCompressPictures="0" strictFirstAndLastChars="0" saveSubsetFonts="1">
   <p:sldMasterIdLst>
-    <p:sldMasterId id="2147483670" r:id="rId5"/>
-    <p:sldMasterId id="2147483671" r:id="rId6"/>
+    <p:sldMasterId id="2147483670" r:id="rId4"/>
+    <p:sldMasterId id="2147483671" r:id="rId5"/>
   </p:sldMasterIdLst>
   <p:notesMasterIdLst>
-    <p:notesMasterId r:id="rId7"/>
+    <p:notesMasterId r:id="rId6"/>
   </p:notesMasterIdLst>
   <p:sldIdLst>
-    <p:sldId id="256" r:id="rId8"/>
-    <p:sldId id="257" r:id="rId9"/>
-    <p:sldId id="258" r:id="rId10"/>
-    <p:sldId id="259" r:id="rId11"/>
-    <p:sldId id="260" r:id="rId12"/>
-    <p:sldId id="261" r:id="rId13"/>
-    <p:sldId id="262" r:id="rId14"/>
-    <p:sldId id="263" r:id="rId15"/>
-    <p:sldId id="264" r:id="rId16"/>
+    <p:sldId id="256" r:id="rId7"/>
+    <p:sldId id="257" r:id="rId8"/>
+    <p:sldId id="258" r:id="rId9"/>
+    <p:sldId id="259" r:id="rId10"/>
+    <p:sldId id="260" r:id="rId11"/>
+    <p:sldId id="261" r:id="rId12"/>
+    <p:sldId id="262" r:id="rId13"/>
+    <p:sldId id="263" r:id="rId14"/>
+    <p:sldId id="264" r:id="rId15"/>
   </p:sldIdLst>
   <p:sldSz cy="5143500" cx="9144000"/>
   <p:notesSz cx="6858000" cy="9144000"/>
@@ -267,26 +267,6 @@
     </p:ext>
   </p:extLst>
 </p:presentation>
-</file>
-
-<file path=ppt/commentAuthors.xml><?xml version="1.0" encoding="utf-8"?>
-<p:cmAuthorLst xmlns:a="http://schemas.openxmlformats.org/drawingml/2006/main" xmlns:r="http://schemas.openxmlformats.org/officeDocument/2006/relationships" xmlns:mc="http://schemas.openxmlformats.org/markup-compatibility/2006" xmlns:mv="urn:schemas-microsoft-com:mac:vml" xmlns:p="http://schemas.openxmlformats.org/presentationml/2006/main" xmlns:c="http://schemas.openxmlformats.org/drawingml/2006/chart" xmlns:dgm="http://schemas.openxmlformats.org/drawingml/2006/diagram" xmlns:o="urn:schemas-microsoft-com:office:office" xmlns:v="urn:schemas-microsoft-com:vml" xmlns:pvml="urn:schemas-microsoft-com:office:powerpoint" xmlns:com="http://schemas.openxmlformats.org/drawingml/2006/compatibility" xmlns:p14="http://schemas.microsoft.com/office/powerpoint/2010/main" xmlns:p15="http://schemas.microsoft.com/office/powerpoint/2012/main" xmlns:ahyp="http://schemas.microsoft.com/office/drawing/2018/hyperlinkcolor">
-  <p:cmAuthor clrIdx="0" id="0" initials="" lastIdx="1" name="Cecilia Arighi"/>
-  <p:cmAuthor clrIdx="1" id="1" initials="" lastIdx="1" name="Chuming Chen"/>
-</p:cmAuthorLst>
-</file>
-
-<file path=ppt/comments/comment1.xml><?xml version="1.0" encoding="utf-8"?>
-<p:cmLst xmlns:a="http://schemas.openxmlformats.org/drawingml/2006/main" xmlns:r="http://schemas.openxmlformats.org/officeDocument/2006/relationships" xmlns:mc="http://schemas.openxmlformats.org/markup-compatibility/2006" xmlns:mv="urn:schemas-microsoft-com:mac:vml" xmlns:p="http://schemas.openxmlformats.org/presentationml/2006/main" xmlns:c="http://schemas.openxmlformats.org/drawingml/2006/chart" xmlns:dgm="http://schemas.openxmlformats.org/drawingml/2006/diagram" xmlns:o="urn:schemas-microsoft-com:office:office" xmlns:v="urn:schemas-microsoft-com:vml" xmlns:pvml="urn:schemas-microsoft-com:office:powerpoint" xmlns:com="http://schemas.openxmlformats.org/drawingml/2006/compatibility" xmlns:p14="http://schemas.microsoft.com/office/powerpoint/2010/main" xmlns:p15="http://schemas.microsoft.com/office/powerpoint/2012/main" xmlns:ahyp="http://schemas.microsoft.com/office/drawing/2018/hyperlinkcolor">
-  <p:cm authorId="0" idx="1" dt="2022-05-19T13:11:59.548">
-    <p:pos x="6000" y="0"/>
-    <p:text>any funding to add? this would be the place</p:text>
-  </p:cm>
-  <p:cm authorId="1" idx="1" dt="2022-05-19T13:11:59.548">
-    <p:pos x="6000" y="0"/>
-    <p:text>Done</p:text>
-  </p:cm>
-</p:cmLst>
 </file>
 
 <file path=ppt/notesMasters/notesMaster1.xml><?xml version="1.0" encoding="utf-8"?>
@@ -2163,7 +2143,7 @@
       </p:grpSpPr>
       <p:sp>
         <p:nvSpPr>
-          <p:cNvPr id="161" name="Google Shape;161;g129cff206dc_2_0:notes"/>
+          <p:cNvPr id="161" name="Google Shape;161;g131999e6961_0_0:notes"/>
           <p:cNvSpPr/>
           <p:nvPr>
             <p:ph idx="2" type="sldImg"/>
@@ -2198,7 +2178,7 @@
       </p:sp>
       <p:sp>
         <p:nvSpPr>
-          <p:cNvPr id="162" name="Google Shape;162;g129cff206dc_2_0:notes"/>
+          <p:cNvPr id="162" name="Google Shape;162;g131999e6961_0_0:notes"/>
           <p:cNvSpPr txBox="1"/>
           <p:nvPr>
             <p:ph idx="1" type="body"/>
@@ -12328,7 +12308,7 @@
         <p:spPr>
           <a:xfrm>
             <a:off x="796150" y="906300"/>
-            <a:ext cx="7212000" cy="2873100"/>
+            <a:ext cx="7212000" cy="3156300"/>
           </a:xfrm>
           <a:prstGeom prst="rect">
             <a:avLst/>
@@ -12400,6 +12380,26 @@
             <a:r>
               <a:rPr lang="en" sz="1600"/>
               <a:t>Hongzhan Huang</a:t>
+            </a:r>
+            <a:endParaRPr sz="1600"/>
+          </a:p>
+          <a:p>
+            <a:pPr indent="-330200" lvl="1" marL="914400" rtl="0" algn="l">
+              <a:lnSpc>
+                <a:spcPct val="115000"/>
+              </a:lnSpc>
+              <a:spcBef>
+                <a:spcPts val="0"/>
+              </a:spcBef>
+              <a:spcAft>
+                <a:spcPts val="0"/>
+              </a:spcAft>
+              <a:buSzPts val="1600"/>
+              <a:buChar char="○"/>
+            </a:pPr>
+            <a:r>
+              <a:rPr lang="en" sz="1600"/>
+              <a:t>Cecilia Arighi</a:t>
             </a:r>
             <a:endParaRPr sz="1600"/>
           </a:p>
@@ -12763,7 +12763,7 @@
         <p:spPr>
           <a:xfrm>
             <a:off x="393650" y="870050"/>
-            <a:ext cx="8024223" cy="3377374"/>
+            <a:ext cx="8024223" cy="3389128"/>
           </a:xfrm>
           <a:prstGeom prst="rect">
             <a:avLst/>
@@ -12948,7 +12948,7 @@
         <p:spPr>
           <a:xfrm>
             <a:off x="892988" y="822063"/>
-            <a:ext cx="7358024" cy="3499375"/>
+            <a:ext cx="7358024" cy="3510153"/>
           </a:xfrm>
           <a:prstGeom prst="rect">
             <a:avLst/>
@@ -13200,7 +13200,7 @@
             </a:r>
             <a:r>
               <a:rPr lang="en" sz="1900"/>
-              <a:t>: ML model, from its selection to its training, evaluation and tuning</a:t>
+              <a:t>: ML models, from its selection to its training, evaluation and tuning</a:t>
             </a:r>
             <a:endParaRPr sz="1900"/>
           </a:p>
@@ -13412,8 +13412,8 @@
         </p:nvSpPr>
         <p:spPr>
           <a:xfrm>
-            <a:off x="1104600" y="1107150"/>
-            <a:ext cx="7727700" cy="3110100"/>
+            <a:off x="311700" y="677400"/>
+            <a:ext cx="8283600" cy="3504000"/>
           </a:xfrm>
           <a:prstGeom prst="rect">
             <a:avLst/>
@@ -13429,7 +13429,7 @@
           </a:bodyPr>
           <a:lstStyle/>
           <a:p>
-            <a:pPr indent="-361950" lvl="0" marL="457200" rtl="0" algn="l">
+            <a:pPr indent="-349250" lvl="0" marL="457200" rtl="0" algn="l">
               <a:lnSpc>
                 <a:spcPct val="115000"/>
               </a:lnSpc>
@@ -13439,17 +13439,17 @@
               <a:spcAft>
                 <a:spcPts val="0"/>
               </a:spcAft>
-              <a:buSzPts val="2100"/>
+              <a:buSzPts val="1900"/>
               <a:buChar char="●"/>
             </a:pPr>
             <a:r>
-              <a:rPr lang="en" sz="2100"/>
+              <a:rPr lang="en" sz="1900"/>
               <a:t>June 13 - 17, 2022, 1:00pm – 5:00pm</a:t>
             </a:r>
-            <a:endParaRPr sz="2100"/>
+            <a:endParaRPr sz="1900"/>
           </a:p>
           <a:p>
-            <a:pPr indent="-361950" lvl="0" marL="457200" rtl="0" algn="l">
+            <a:pPr indent="-349250" lvl="0" marL="457200" rtl="0" algn="l">
               <a:lnSpc>
                 <a:spcPct val="115000"/>
               </a:lnSpc>
@@ -13459,14 +13459,34 @@
               <a:spcAft>
                 <a:spcPts val="0"/>
               </a:spcAft>
-              <a:buSzPts val="2100"/>
+              <a:buSzPts val="1900"/>
               <a:buChar char="●"/>
             </a:pPr>
             <a:r>
-              <a:rPr lang="en" sz="2100"/>
+              <a:rPr lang="en" sz="1900"/>
               <a:t>Ammon Pinizzotto Biopharmaceutical Innovation Center conference room 140</a:t>
             </a:r>
-            <a:endParaRPr sz="2100"/>
+            <a:endParaRPr sz="1900"/>
+          </a:p>
+          <a:p>
+            <a:pPr indent="-349250" lvl="0" marL="457200" rtl="0" algn="l">
+              <a:lnSpc>
+                <a:spcPct val="115000"/>
+              </a:lnSpc>
+              <a:spcBef>
+                <a:spcPts val="0"/>
+              </a:spcBef>
+              <a:spcAft>
+                <a:spcPts val="0"/>
+              </a:spcAft>
+              <a:buSzPts val="1900"/>
+              <a:buChar char="●"/>
+            </a:pPr>
+            <a:r>
+              <a:rPr lang="en" sz="1900"/>
+              <a:t>Slack Channel (https://ud-cbcbcore-workshops.slack.com/archives/C03G09R43SA)</a:t>
+            </a:r>
+            <a:endParaRPr sz="1900"/>
           </a:p>
           <a:p>
             <a:pPr indent="0" lvl="0" marL="457200" rtl="0" algn="l">
@@ -13484,7 +13504,7 @@
             <a:r>
               <a:t/>
             </a:r>
-            <a:endParaRPr sz="2100"/>
+            <a:endParaRPr sz="1900"/>
           </a:p>
           <a:p>
             <a:pPr indent="0" lvl="0" marL="0" rtl="0" algn="l">
@@ -13500,13 +13520,13 @@
               <a:buNone/>
             </a:pPr>
             <a:r>
-              <a:rPr lang="en" sz="2100"/>
+              <a:rPr lang="en" sz="1900"/>
               <a:t>Daily Activities:</a:t>
             </a:r>
-            <a:endParaRPr sz="2100"/>
+            <a:endParaRPr sz="1900"/>
           </a:p>
           <a:p>
-            <a:pPr indent="-361950" lvl="0" marL="457200" rtl="0" algn="l">
+            <a:pPr indent="-349250" lvl="0" marL="457200" rtl="0" algn="l">
               <a:lnSpc>
                 <a:spcPct val="115000"/>
               </a:lnSpc>
@@ -13516,17 +13536,17 @@
               <a:spcAft>
                 <a:spcPts val="0"/>
               </a:spcAft>
-              <a:buSzPts val="2100"/>
+              <a:buSzPts val="1900"/>
               <a:buChar char="●"/>
             </a:pPr>
             <a:r>
-              <a:rPr lang="en" sz="2100"/>
+              <a:rPr lang="en" sz="1900"/>
               <a:t>Lectures</a:t>
             </a:r>
-            <a:endParaRPr sz="2600"/>
+            <a:endParaRPr sz="2400"/>
           </a:p>
           <a:p>
-            <a:pPr indent="-361950" lvl="0" marL="457200" rtl="0" algn="l">
+            <a:pPr indent="-349250" lvl="0" marL="457200" rtl="0" algn="l">
               <a:lnSpc>
                 <a:spcPct val="115000"/>
               </a:lnSpc>
@@ -13536,17 +13556,17 @@
               <a:spcAft>
                 <a:spcPts val="0"/>
               </a:spcAft>
-              <a:buSzPts val="2100"/>
+              <a:buSzPts val="1900"/>
               <a:buChar char="●"/>
             </a:pPr>
             <a:r>
-              <a:rPr lang="en" sz="2100"/>
+              <a:rPr lang="en" sz="1900"/>
               <a:t>Live demos (Google Colaboratory)</a:t>
             </a:r>
-            <a:endParaRPr sz="2100"/>
+            <a:endParaRPr sz="1900"/>
           </a:p>
           <a:p>
-            <a:pPr indent="-361950" lvl="0" marL="457200" rtl="0" algn="l">
+            <a:pPr indent="-349250" lvl="0" marL="457200" rtl="0" algn="l">
               <a:lnSpc>
                 <a:spcPct val="115000"/>
               </a:lnSpc>
@@ -13556,14 +13576,14 @@
               <a:spcAft>
                 <a:spcPts val="0"/>
               </a:spcAft>
-              <a:buSzPts val="2100"/>
+              <a:buSzPts val="1900"/>
               <a:buChar char="●"/>
             </a:pPr>
             <a:r>
-              <a:rPr lang="en" sz="2100"/>
+              <a:rPr lang="en" sz="1900"/>
               <a:t>Hands-on exercises (Google Colaboratory)</a:t>
             </a:r>
-            <a:endParaRPr sz="2100"/>
+            <a:endParaRPr sz="1900"/>
           </a:p>
         </p:txBody>
       </p:sp>
@@ -13733,7 +13753,7 @@
         <p:spPr>
           <a:xfrm>
             <a:off x="311700" y="717650"/>
-            <a:ext cx="8665500" cy="3836400"/>
+            <a:ext cx="8665500" cy="3606300"/>
           </a:xfrm>
           <a:prstGeom prst="rect">
             <a:avLst/>
@@ -13838,7 +13858,7 @@
             </a:pPr>
             <a:r>
               <a:rPr lang="en" sz="1300"/>
-              <a:t>All participants must complete the UD COVID Check (https://covidcheck.udel.edu) each day before arriving on UD’s campus.  While the University of Delaware no longer requires masks to be worn for non-classroom events, all participants are encouraged to bring a mask for use whenever social distancing cannot be maintained.  </a:t>
+              <a:t>Face mask requirements remain in place for all indoor spaces in accordance with CDC guidance pertaining to the local Delaware community. </a:t>
             </a:r>
             <a:endParaRPr sz="1300"/>
           </a:p>
@@ -13988,7 +14008,7 @@
           <p:nvPr/>
         </p:nvPicPr>
         <p:blipFill>
-          <a:blip r:embed="rId4">
+          <a:blip r:embed="rId3">
             <a:alphaModFix/>
           </a:blip>
           <a:stretch>
@@ -14039,6 +14059,11 @@
               <a:spcAft>
                 <a:spcPts val="0"/>
               </a:spcAft>
+              <a:buClr>
+                <a:schemeClr val="dk1"/>
+              </a:buClr>
+              <a:buSzPct val="39285"/>
+              <a:buFont typeface="Arial"/>
               <a:buNone/>
             </a:pPr>
             <a:r>
@@ -14060,152 +14085,6 @@
       <p:sp>
         <p:nvSpPr>
           <p:cNvPr id="166" name="Google Shape;166;p33"/>
-          <p:cNvSpPr txBox="1"/>
-          <p:nvPr/>
-        </p:nvSpPr>
-        <p:spPr>
-          <a:xfrm>
-            <a:off x="548700" y="717650"/>
-            <a:ext cx="3595500" cy="2366700"/>
-          </a:xfrm>
-          <a:prstGeom prst="rect">
-            <a:avLst/>
-          </a:prstGeom>
-          <a:noFill/>
-          <a:ln>
-            <a:noFill/>
-          </a:ln>
-        </p:spPr>
-        <p:txBody>
-          <a:bodyPr anchorCtr="0" anchor="t" bIns="91425" lIns="91425" spcFirstLastPara="1" rIns="91425" wrap="square" tIns="91425">
-            <a:spAutoFit/>
-          </a:bodyPr>
-          <a:lstStyle/>
-          <a:p>
-            <a:pPr indent="-361950" lvl="0" marL="457200" rtl="0" algn="l">
-              <a:lnSpc>
-                <a:spcPct val="115000"/>
-              </a:lnSpc>
-              <a:spcBef>
-                <a:spcPts val="0"/>
-              </a:spcBef>
-              <a:spcAft>
-                <a:spcPts val="0"/>
-              </a:spcAft>
-              <a:buSzPts val="2100"/>
-              <a:buChar char="●"/>
-            </a:pPr>
-            <a:r>
-              <a:rPr lang="en" sz="2100"/>
-              <a:t>Cathy Wu</a:t>
-            </a:r>
-            <a:endParaRPr sz="2100"/>
-          </a:p>
-          <a:p>
-            <a:pPr indent="-361950" lvl="0" marL="457200" rtl="0" algn="l">
-              <a:lnSpc>
-                <a:spcPct val="115000"/>
-              </a:lnSpc>
-              <a:spcBef>
-                <a:spcPts val="0"/>
-              </a:spcBef>
-              <a:spcAft>
-                <a:spcPts val="0"/>
-              </a:spcAft>
-              <a:buSzPts val="2100"/>
-              <a:buChar char="●"/>
-            </a:pPr>
-            <a:r>
-              <a:rPr lang="en" sz="2100"/>
-              <a:t>Shawn Polson</a:t>
-            </a:r>
-            <a:endParaRPr sz="2100"/>
-          </a:p>
-          <a:p>
-            <a:pPr indent="-361950" lvl="0" marL="457200" rtl="0" algn="l">
-              <a:lnSpc>
-                <a:spcPct val="115000"/>
-              </a:lnSpc>
-              <a:spcBef>
-                <a:spcPts val="0"/>
-              </a:spcBef>
-              <a:spcAft>
-                <a:spcPts val="0"/>
-              </a:spcAft>
-              <a:buSzPts val="2100"/>
-              <a:buChar char="●"/>
-            </a:pPr>
-            <a:r>
-              <a:rPr lang="en" sz="2100"/>
-              <a:t>Cecilia Arighi</a:t>
-            </a:r>
-            <a:endParaRPr sz="2100"/>
-          </a:p>
-          <a:p>
-            <a:pPr indent="-361950" lvl="0" marL="457200" rtl="0" algn="l">
-              <a:lnSpc>
-                <a:spcPct val="115000"/>
-              </a:lnSpc>
-              <a:spcBef>
-                <a:spcPts val="0"/>
-              </a:spcBef>
-              <a:spcAft>
-                <a:spcPts val="0"/>
-              </a:spcAft>
-              <a:buSzPts val="2100"/>
-              <a:buChar char="●"/>
-            </a:pPr>
-            <a:r>
-              <a:rPr lang="en" sz="2100"/>
-              <a:t>Amelia Harrison</a:t>
-            </a:r>
-            <a:endParaRPr sz="2100"/>
-          </a:p>
-          <a:p>
-            <a:pPr indent="-361950" lvl="0" marL="457200" rtl="0" algn="l">
-              <a:lnSpc>
-                <a:spcPct val="115000"/>
-              </a:lnSpc>
-              <a:spcBef>
-                <a:spcPts val="0"/>
-              </a:spcBef>
-              <a:spcAft>
-                <a:spcPts val="0"/>
-              </a:spcAft>
-              <a:buSzPts val="2100"/>
-              <a:buChar char="●"/>
-            </a:pPr>
-            <a:r>
-              <a:rPr lang="en" sz="2100"/>
-              <a:t>Rita Hayford</a:t>
-            </a:r>
-            <a:endParaRPr sz="2100"/>
-          </a:p>
-          <a:p>
-            <a:pPr indent="-361950" lvl="0" marL="457200" rtl="0" algn="l">
-              <a:lnSpc>
-                <a:spcPct val="115000"/>
-              </a:lnSpc>
-              <a:spcBef>
-                <a:spcPts val="0"/>
-              </a:spcBef>
-              <a:spcAft>
-                <a:spcPts val="0"/>
-              </a:spcAft>
-              <a:buSzPts val="2100"/>
-              <a:buChar char="●"/>
-            </a:pPr>
-            <a:r>
-              <a:rPr lang="en" sz="2100"/>
-              <a:t>Yuqi Wang</a:t>
-            </a:r>
-            <a:endParaRPr sz="2100"/>
-          </a:p>
-        </p:txBody>
-      </p:sp>
-      <p:sp>
-        <p:nvSpPr>
-          <p:cNvPr id="167" name="Google Shape;167;p33"/>
           <p:cNvSpPr txBox="1"/>
           <p:nvPr>
             <p:ph idx="12" type="sldNum"/>
@@ -14256,6 +14135,132 @@
               <a:cs typeface="Arial"/>
               <a:sym typeface="Arial"/>
             </a:endParaRPr>
+          </a:p>
+        </p:txBody>
+      </p:sp>
+      <p:sp>
+        <p:nvSpPr>
+          <p:cNvPr id="167" name="Google Shape;167;p33"/>
+          <p:cNvSpPr txBox="1"/>
+          <p:nvPr/>
+        </p:nvSpPr>
+        <p:spPr>
+          <a:xfrm>
+            <a:off x="548700" y="717650"/>
+            <a:ext cx="3595500" cy="1994700"/>
+          </a:xfrm>
+          <a:prstGeom prst="rect">
+            <a:avLst/>
+          </a:prstGeom>
+          <a:noFill/>
+          <a:ln>
+            <a:noFill/>
+          </a:ln>
+        </p:spPr>
+        <p:txBody>
+          <a:bodyPr anchorCtr="0" anchor="t" bIns="91425" lIns="91425" spcFirstLastPara="1" rIns="91425" wrap="square" tIns="91425">
+            <a:spAutoFit/>
+          </a:bodyPr>
+          <a:lstStyle/>
+          <a:p>
+            <a:pPr indent="-361950" lvl="0" marL="457200" rtl="0" algn="l">
+              <a:lnSpc>
+                <a:spcPct val="115000"/>
+              </a:lnSpc>
+              <a:spcBef>
+                <a:spcPts val="0"/>
+              </a:spcBef>
+              <a:spcAft>
+                <a:spcPts val="0"/>
+              </a:spcAft>
+              <a:buSzPts val="2100"/>
+              <a:buChar char="●"/>
+            </a:pPr>
+            <a:r>
+              <a:rPr lang="en" sz="2100"/>
+              <a:t>Cathy Wu</a:t>
+            </a:r>
+            <a:endParaRPr sz="2100"/>
+          </a:p>
+          <a:p>
+            <a:pPr indent="-361950" lvl="0" marL="457200" rtl="0" algn="l">
+              <a:lnSpc>
+                <a:spcPct val="115000"/>
+              </a:lnSpc>
+              <a:spcBef>
+                <a:spcPts val="0"/>
+              </a:spcBef>
+              <a:spcAft>
+                <a:spcPts val="0"/>
+              </a:spcAft>
+              <a:buSzPts val="2100"/>
+              <a:buChar char="●"/>
+            </a:pPr>
+            <a:r>
+              <a:rPr lang="en" sz="2100"/>
+              <a:t>Shawn Polson</a:t>
+            </a:r>
+            <a:endParaRPr sz="2100"/>
+          </a:p>
+          <a:p>
+            <a:pPr indent="-361950" lvl="0" marL="457200" rtl="0" algn="l">
+              <a:lnSpc>
+                <a:spcPct val="115000"/>
+              </a:lnSpc>
+              <a:spcBef>
+                <a:spcPts val="0"/>
+              </a:spcBef>
+              <a:spcAft>
+                <a:spcPts val="0"/>
+              </a:spcAft>
+              <a:buSzPts val="2100"/>
+              <a:buChar char="●"/>
+            </a:pPr>
+            <a:r>
+              <a:rPr lang="en" sz="2100"/>
+              <a:t>Amelia Harrison</a:t>
+            </a:r>
+            <a:endParaRPr sz="2100"/>
+          </a:p>
+          <a:p>
+            <a:pPr indent="-361950" lvl="0" marL="457200" rtl="0" algn="l">
+              <a:lnSpc>
+                <a:spcPct val="115000"/>
+              </a:lnSpc>
+              <a:spcBef>
+                <a:spcPts val="0"/>
+              </a:spcBef>
+              <a:spcAft>
+                <a:spcPts val="0"/>
+              </a:spcAft>
+              <a:buSzPts val="2100"/>
+              <a:buChar char="●"/>
+            </a:pPr>
+            <a:r>
+              <a:rPr lang="en" sz="2100"/>
+              <a:t>Rita Hayford</a:t>
+            </a:r>
+            <a:endParaRPr sz="2100"/>
+          </a:p>
+          <a:p>
+            <a:pPr indent="-361950" lvl="0" marL="457200" rtl="0" algn="l">
+              <a:lnSpc>
+                <a:spcPct val="115000"/>
+              </a:lnSpc>
+              <a:spcBef>
+                <a:spcPts val="0"/>
+              </a:spcBef>
+              <a:spcAft>
+                <a:spcPts val="0"/>
+              </a:spcAft>
+              <a:buSzPts val="2100"/>
+              <a:buChar char="●"/>
+            </a:pPr>
+            <a:r>
+              <a:rPr lang="en" sz="2100"/>
+              <a:t>Yuqi Wang</a:t>
+            </a:r>
+            <a:endParaRPr sz="2100"/>
           </a:p>
         </p:txBody>
       </p:sp>
@@ -14317,9 +14322,9 @@
 </file>
 
 <file path=ppt/theme/theme1.xml><?xml version="1.0" encoding="utf-8"?>
-<a:theme xmlns:a="http://schemas.openxmlformats.org/drawingml/2006/main" xmlns:r="http://schemas.openxmlformats.org/officeDocument/2006/relationships" name="Simple Light">
+<a:theme xmlns:a="http://schemas.openxmlformats.org/drawingml/2006/main" xmlns:r="http://schemas.openxmlformats.org/officeDocument/2006/relationships">
   <a:themeElements>
-    <a:clrScheme name="Simple Light">
+    <a:clrScheme name="Default">
       <a:dk1>
         <a:srgbClr val="000000"/>
       </a:dk1>
@@ -14327,34 +14332,34 @@
         <a:srgbClr val="FFFFFF"/>
       </a:lt1>
       <a:dk2>
-        <a:srgbClr val="595959"/>
+        <a:srgbClr val="158158"/>
       </a:dk2>
       <a:lt2>
-        <a:srgbClr val="EEEEEE"/>
+        <a:srgbClr val="F3F3F3"/>
       </a:lt2>
       <a:accent1>
-        <a:srgbClr val="4285F4"/>
+        <a:srgbClr val="058DC7"/>
       </a:accent1>
       <a:accent2>
-        <a:srgbClr val="212121"/>
+        <a:srgbClr val="50B432"/>
       </a:accent2>
       <a:accent3>
-        <a:srgbClr val="78909C"/>
+        <a:srgbClr val="ED561B"/>
       </a:accent3>
       <a:accent4>
-        <a:srgbClr val="FFAB40"/>
+        <a:srgbClr val="EDEF00"/>
       </a:accent4>
       <a:accent5>
-        <a:srgbClr val="0097A7"/>
+        <a:srgbClr val="24CBE5"/>
       </a:accent5>
       <a:accent6>
-        <a:srgbClr val="EEFF41"/>
+        <a:srgbClr val="64E572"/>
       </a:accent6>
       <a:hlink>
-        <a:srgbClr val="0097A7"/>
+        <a:srgbClr val="2200CC"/>
       </a:hlink>
       <a:folHlink>
-        <a:srgbClr val="0097A7"/>
+        <a:srgbClr val="551A8B"/>
       </a:folHlink>
     </a:clrScheme>
     <a:fontScheme name="Office">
@@ -14596,9 +14601,9 @@
 </file>
 
 <file path=ppt/theme/theme2.xml><?xml version="1.0" encoding="utf-8"?>
-<a:theme xmlns:a="http://schemas.openxmlformats.org/drawingml/2006/main" xmlns:r="http://schemas.openxmlformats.org/officeDocument/2006/relationships">
+<a:theme xmlns:a="http://schemas.openxmlformats.org/drawingml/2006/main" xmlns:r="http://schemas.openxmlformats.org/officeDocument/2006/relationships" name="Simple Light">
   <a:themeElements>
-    <a:clrScheme name="Default">
+    <a:clrScheme name="Simple Light">
       <a:dk1>
         <a:srgbClr val="000000"/>
       </a:dk1>
@@ -14606,34 +14611,34 @@
         <a:srgbClr val="FFFFFF"/>
       </a:lt1>
       <a:dk2>
-        <a:srgbClr val="158158"/>
+        <a:srgbClr val="595959"/>
       </a:dk2>
       <a:lt2>
-        <a:srgbClr val="F3F3F3"/>
+        <a:srgbClr val="EEEEEE"/>
       </a:lt2>
       <a:accent1>
-        <a:srgbClr val="058DC7"/>
+        <a:srgbClr val="4285F4"/>
       </a:accent1>
       <a:accent2>
-        <a:srgbClr val="50B432"/>
+        <a:srgbClr val="212121"/>
       </a:accent2>
       <a:accent3>
-        <a:srgbClr val="ED561B"/>
+        <a:srgbClr val="78909C"/>
       </a:accent3>
       <a:accent4>
-        <a:srgbClr val="EDEF00"/>
+        <a:srgbClr val="FFAB40"/>
       </a:accent4>
       <a:accent5>
-        <a:srgbClr val="24CBE5"/>
+        <a:srgbClr val="0097A7"/>
       </a:accent5>
       <a:accent6>
-        <a:srgbClr val="64E572"/>
+        <a:srgbClr val="EEFF41"/>
       </a:accent6>
       <a:hlink>
-        <a:srgbClr val="2200CC"/>
+        <a:srgbClr val="0097A7"/>
       </a:hlink>
       <a:folHlink>
-        <a:srgbClr val="551A8B"/>
+        <a:srgbClr val="0097A7"/>
       </a:folHlink>
     </a:clrScheme>
     <a:fontScheme name="Office">

</xml_diff>

<commit_message>
add CBI to acknowledgement slide
</commit_message>
<xml_diff>
--- a/Day_1/Lectures/Day_1_Introduction_to_Workshop.pptx
+++ b/Day_1/Lectures/Day_1_Introduction_to_Workshop.pptx
@@ -14273,7 +14273,7 @@
         <p:spPr>
           <a:xfrm>
             <a:off x="611000" y="3328925"/>
-            <a:ext cx="7353000" cy="738900"/>
+            <a:ext cx="7353000" cy="1015800"/>
           </a:xfrm>
           <a:prstGeom prst="rect">
             <a:avLst/>
@@ -14307,7 +14307,7 @@
                   <a:srgbClr val="FFFFFF"/>
                 </a:highlight>
               </a:rPr>
-              <a:t>This workshop is offered free of charge with support from the NIH National Institute for General Medical Sciences (T32GM133395-03S1).</a:t>
+              <a:t>This workshop is offered free of charge with support from the NIH National Institute for General Medical Sciences (T32GM133395-03S1) granted to UD Chemistry-Biology Interface Program.</a:t>
             </a:r>
             <a:endParaRPr sz="2000"/>
           </a:p>

</xml_diff>

<commit_message>
update day 1 notebooks
</commit_message>
<xml_diff>
--- a/Day_1/Lectures/Day_1_Introduction_to_Workshop.pptx
+++ b/Day_1/Lectures/Day_1_Introduction_to_Workshop.pptx
@@ -14326,9 +14326,9 @@
 </file>
 
 <file path=ppt/theme/theme1.xml><?xml version="1.0" encoding="utf-8"?>
-<a:theme xmlns:a="http://schemas.openxmlformats.org/drawingml/2006/main" xmlns:r="http://schemas.openxmlformats.org/officeDocument/2006/relationships" name="Simple Light">
+<a:theme xmlns:a="http://schemas.openxmlformats.org/drawingml/2006/main" xmlns:r="http://schemas.openxmlformats.org/officeDocument/2006/relationships">
   <a:themeElements>
-    <a:clrScheme name="Simple Light">
+    <a:clrScheme name="Default">
       <a:dk1>
         <a:srgbClr val="000000"/>
       </a:dk1>
@@ -14336,34 +14336,34 @@
         <a:srgbClr val="FFFFFF"/>
       </a:lt1>
       <a:dk2>
-        <a:srgbClr val="595959"/>
+        <a:srgbClr val="158158"/>
       </a:dk2>
       <a:lt2>
-        <a:srgbClr val="EEEEEE"/>
+        <a:srgbClr val="F3F3F3"/>
       </a:lt2>
       <a:accent1>
-        <a:srgbClr val="4285F4"/>
+        <a:srgbClr val="058DC7"/>
       </a:accent1>
       <a:accent2>
-        <a:srgbClr val="212121"/>
+        <a:srgbClr val="50B432"/>
       </a:accent2>
       <a:accent3>
-        <a:srgbClr val="78909C"/>
+        <a:srgbClr val="ED561B"/>
       </a:accent3>
       <a:accent4>
-        <a:srgbClr val="FFAB40"/>
+        <a:srgbClr val="EDEF00"/>
       </a:accent4>
       <a:accent5>
-        <a:srgbClr val="0097A7"/>
+        <a:srgbClr val="24CBE5"/>
       </a:accent5>
       <a:accent6>
-        <a:srgbClr val="EEFF41"/>
+        <a:srgbClr val="64E572"/>
       </a:accent6>
       <a:hlink>
-        <a:srgbClr val="0097A7"/>
+        <a:srgbClr val="2200CC"/>
       </a:hlink>
       <a:folHlink>
-        <a:srgbClr val="0097A7"/>
+        <a:srgbClr val="551A8B"/>
       </a:folHlink>
     </a:clrScheme>
     <a:fontScheme name="Office">
@@ -14884,9 +14884,9 @@
 </file>
 
 <file path=ppt/theme/theme3.xml><?xml version="1.0" encoding="utf-8"?>
-<a:theme xmlns:a="http://schemas.openxmlformats.org/drawingml/2006/main" xmlns:r="http://schemas.openxmlformats.org/officeDocument/2006/relationships">
+<a:theme xmlns:a="http://schemas.openxmlformats.org/drawingml/2006/main" xmlns:r="http://schemas.openxmlformats.org/officeDocument/2006/relationships" name="Simple Light">
   <a:themeElements>
-    <a:clrScheme name="Default">
+    <a:clrScheme name="Simple Light">
       <a:dk1>
         <a:srgbClr val="000000"/>
       </a:dk1>
@@ -14894,34 +14894,34 @@
         <a:srgbClr val="FFFFFF"/>
       </a:lt1>
       <a:dk2>
-        <a:srgbClr val="158158"/>
+        <a:srgbClr val="595959"/>
       </a:dk2>
       <a:lt2>
-        <a:srgbClr val="F3F3F3"/>
+        <a:srgbClr val="EEEEEE"/>
       </a:lt2>
       <a:accent1>
-        <a:srgbClr val="058DC7"/>
+        <a:srgbClr val="4285F4"/>
       </a:accent1>
       <a:accent2>
-        <a:srgbClr val="50B432"/>
+        <a:srgbClr val="212121"/>
       </a:accent2>
       <a:accent3>
-        <a:srgbClr val="ED561B"/>
+        <a:srgbClr val="78909C"/>
       </a:accent3>
       <a:accent4>
-        <a:srgbClr val="EDEF00"/>
+        <a:srgbClr val="FFAB40"/>
       </a:accent4>
       <a:accent5>
-        <a:srgbClr val="24CBE5"/>
+        <a:srgbClr val="0097A7"/>
       </a:accent5>
       <a:accent6>
-        <a:srgbClr val="64E572"/>
+        <a:srgbClr val="EEFF41"/>
       </a:accent6>
       <a:hlink>
-        <a:srgbClr val="2200CC"/>
+        <a:srgbClr val="0097A7"/>
       </a:hlink>
       <a:folHlink>
-        <a:srgbClr val="551A8B"/>
+        <a:srgbClr val="0097A7"/>
       </a:folHlink>
     </a:clrScheme>
     <a:fontScheme name="Office">

</xml_diff>